<commit_message>
added per day and overall calendar view
</commit_message>
<xml_diff>
--- a/interface TODAY.pptx
+++ b/interface TODAY.pptx
@@ -104,6 +104,11 @@
       </a:defRPr>
     </a:lvl9pPr>
   </p:defaultTextStyle>
+  <p:extLst>
+    <p:ext uri="{EFAFB233-063F-42B5-8137-9DF3F51BA10A}">
+      <p15:sldGuideLst xmlns:p15="http://schemas.microsoft.com/office/powerpoint/2012/main"/>
+    </p:ext>
+  </p:extLst>
 </p:presentation>
 </file>
 
@@ -12496,6 +12501,101 @@
           </a:prstGeom>
         </p:spPr>
       </p:pic>
+      <p:sp>
+        <p:nvSpPr>
+          <p:cNvPr id="2" name="Rectangle 1">
+            <a:extLst>
+              <a:ext uri="{FF2B5EF4-FFF2-40B4-BE49-F238E27FC236}">
+                <a16:creationId xmlns:a16="http://schemas.microsoft.com/office/drawing/2014/main" id="{99590A7F-E94C-BD56-AE00-A5DF3DFA70A3}"/>
+              </a:ext>
+            </a:extLst>
+          </p:cNvPr>
+          <p:cNvSpPr/>
+          <p:nvPr/>
+        </p:nvSpPr>
+        <p:spPr>
+          <a:xfrm>
+            <a:off x="755650" y="508000"/>
+            <a:ext cx="9639300" cy="188799"/>
+          </a:xfrm>
+          <a:prstGeom prst="rect">
+            <a:avLst/>
+          </a:prstGeom>
+          <a:solidFill>
+            <a:schemeClr val="tx2">
+              <a:lumMod val="25000"/>
+              <a:lumOff val="75000"/>
+            </a:schemeClr>
+          </a:solidFill>
+        </p:spPr>
+        <p:style>
+          <a:lnRef idx="2">
+            <a:schemeClr val="accent1">
+              <a:shade val="15000"/>
+            </a:schemeClr>
+          </a:lnRef>
+          <a:fillRef idx="1">
+            <a:schemeClr val="accent1"/>
+          </a:fillRef>
+          <a:effectRef idx="0">
+            <a:schemeClr val="accent1"/>
+          </a:effectRef>
+          <a:fontRef idx="minor">
+            <a:schemeClr val="lt1"/>
+          </a:fontRef>
+        </p:style>
+        <p:txBody>
+          <a:bodyPr rtlCol="0" anchor="ctr"/>
+          <a:lstStyle/>
+          <a:p>
+            <a:pPr algn="ctr"/>
+            <a:r>
+              <a:rPr lang="en-US" sz="1400" dirty="0">
+                <a:solidFill>
+                  <a:schemeClr val="tx1"/>
+                </a:solidFill>
+              </a:rPr>
+              <a:t>Today</a:t>
+            </a:r>
+            <a:endParaRPr lang="bg-BG" sz="1400" dirty="0">
+              <a:solidFill>
+                <a:schemeClr val="tx1"/>
+              </a:solidFill>
+            </a:endParaRPr>
+          </a:p>
+        </p:txBody>
+      </p:sp>
+      <p:pic>
+        <p:nvPicPr>
+          <p:cNvPr id="21" name="Picture 20">
+            <a:extLst>
+              <a:ext uri="{FF2B5EF4-FFF2-40B4-BE49-F238E27FC236}">
+                <a16:creationId xmlns:a16="http://schemas.microsoft.com/office/drawing/2014/main" id="{849E8523-853D-8661-D945-DD7A75E4BB2D}"/>
+              </a:ext>
+            </a:extLst>
+          </p:cNvPr>
+          <p:cNvPicPr>
+            <a:picLocks noChangeAspect="1"/>
+          </p:cNvPicPr>
+          <p:nvPr/>
+        </p:nvPicPr>
+        <p:blipFill>
+          <a:blip r:embed="rId3"/>
+          <a:srcRect t="19420"/>
+          <a:stretch>
+            <a:fillRect/>
+          </a:stretch>
+        </p:blipFill>
+        <p:spPr>
+          <a:xfrm>
+            <a:off x="245165" y="116734"/>
+            <a:ext cx="11191185" cy="381000"/>
+          </a:xfrm>
+          <a:prstGeom prst="rect">
+            <a:avLst/>
+          </a:prstGeom>
+        </p:spPr>
+      </p:pic>
     </p:spTree>
     <p:extLst>
       <p:ext uri="{BB962C8B-B14F-4D97-AF65-F5344CB8AC3E}">

</xml_diff>

<commit_message>
implement day view modal with detailed load information and styles
</commit_message>
<xml_diff>
--- a/interface TODAY.pptx
+++ b/interface TODAY.pptx
@@ -6,6 +6,7 @@
   </p:sldMasterIdLst>
   <p:sldIdLst>
     <p:sldId id="256" r:id="rId2"/>
+    <p:sldId id="257" r:id="rId3"/>
   </p:sldIdLst>
   <p:sldSz cx="12192000" cy="6858000"/>
   <p:notesSz cx="6858000" cy="9144000"/>
@@ -3504,9 +3505,7 @@
             <a:avLst/>
           </a:prstGeom>
           <a:solidFill>
-            <a:schemeClr val="bg2">
-              <a:lumMod val="90000"/>
-            </a:schemeClr>
+            <a:srgbClr val="00B050"/>
           </a:solidFill>
           <a:ln>
             <a:solidFill>
@@ -3541,7 +3540,7 @@
                   <a:schemeClr val="tx1"/>
                 </a:solidFill>
               </a:rPr>
-              <a:t>unloading</a:t>
+              <a:t>IN</a:t>
             </a:r>
             <a:endParaRPr lang="bg-BG" sz="1000" dirty="0">
               <a:solidFill>
@@ -3708,9 +3707,7 @@
             <a:avLst/>
           </a:prstGeom>
           <a:solidFill>
-            <a:schemeClr val="bg2">
-              <a:lumMod val="90000"/>
-            </a:schemeClr>
+            <a:srgbClr val="FFC000"/>
           </a:solidFill>
           <a:ln>
             <a:solidFill>
@@ -3745,7 +3742,7 @@
                   <a:schemeClr val="tx1"/>
                 </a:solidFill>
               </a:rPr>
-              <a:t>Loading</a:t>
+              <a:t>OUT</a:t>
             </a:r>
             <a:endParaRPr lang="bg-BG" sz="1000" dirty="0">
               <a:solidFill>
@@ -12555,7 +12552,7 @@
                   <a:schemeClr val="tx1"/>
                 </a:solidFill>
               </a:rPr>
-              <a:t>Today</a:t>
+              <a:t>Date (chosen by the user)</a:t>
             </a:r>
             <a:endParaRPr lang="bg-BG" sz="1400" dirty="0">
               <a:solidFill>
@@ -12565,12 +12562,2590 @@
           </a:p>
         </p:txBody>
       </p:sp>
+    </p:spTree>
+    <p:extLst>
+      <p:ext uri="{BB962C8B-B14F-4D97-AF65-F5344CB8AC3E}">
+        <p14:creationId xmlns:p14="http://schemas.microsoft.com/office/powerpoint/2010/main" val="3570448956"/>
+      </p:ext>
+    </p:extLst>
+  </p:cSld>
+  <p:clrMapOvr>
+    <a:masterClrMapping/>
+  </p:clrMapOvr>
+</p:sld>
+</file>
+
+<file path=ppt/slides/slide2.xml><?xml version="1.0" encoding="utf-8"?>
+<p:sld xmlns:a="http://schemas.openxmlformats.org/drawingml/2006/main" xmlns:r="http://schemas.openxmlformats.org/officeDocument/2006/relationships" xmlns:p="http://schemas.openxmlformats.org/presentationml/2006/main">
+  <p:cSld>
+    <p:spTree>
+      <p:nvGrpSpPr>
+        <p:cNvPr id="1" name="">
+          <a:extLst>
+            <a:ext uri="{FF2B5EF4-FFF2-40B4-BE49-F238E27FC236}">
+              <a16:creationId xmlns:a16="http://schemas.microsoft.com/office/drawing/2014/main" id="{AA231D9A-E19D-A179-1EC5-DCE0B481143A}"/>
+            </a:ext>
+          </a:extLst>
+        </p:cNvPr>
+        <p:cNvGrpSpPr/>
+        <p:nvPr/>
+      </p:nvGrpSpPr>
+      <p:grpSpPr>
+        <a:xfrm>
+          <a:off x="0" y="0"/>
+          <a:ext cx="0" cy="0"/>
+          <a:chOff x="0" y="0"/>
+          <a:chExt cx="0" cy="0"/>
+        </a:xfrm>
+      </p:grpSpPr>
+      <p:sp>
+        <p:nvSpPr>
+          <p:cNvPr id="5" name="Arrow: Chevron 4">
+            <a:extLst>
+              <a:ext uri="{FF2B5EF4-FFF2-40B4-BE49-F238E27FC236}">
+                <a16:creationId xmlns:a16="http://schemas.microsoft.com/office/drawing/2014/main" id="{E1BBE889-DD7C-6654-50A3-0C2584B4C41A}"/>
+              </a:ext>
+            </a:extLst>
+          </p:cNvPr>
+          <p:cNvSpPr/>
+          <p:nvPr/>
+        </p:nvSpPr>
+        <p:spPr>
+          <a:xfrm>
+            <a:off x="1917700" y="717550"/>
+            <a:ext cx="682188" cy="380250"/>
+          </a:xfrm>
+          <a:prstGeom prst="chevron">
+            <a:avLst/>
+          </a:prstGeom>
+          <a:solidFill>
+            <a:schemeClr val="bg2">
+              <a:lumMod val="90000"/>
+            </a:schemeClr>
+          </a:solidFill>
+          <a:ln>
+            <a:solidFill>
+              <a:schemeClr val="bg1"/>
+            </a:solidFill>
+          </a:ln>
+        </p:spPr>
+        <p:style>
+          <a:lnRef idx="2">
+            <a:schemeClr val="accent1">
+              <a:shade val="15000"/>
+            </a:schemeClr>
+          </a:lnRef>
+          <a:fillRef idx="1">
+            <a:schemeClr val="accent1"/>
+          </a:fillRef>
+          <a:effectRef idx="0">
+            <a:schemeClr val="accent1"/>
+          </a:effectRef>
+          <a:fontRef idx="minor">
+            <a:schemeClr val="lt1"/>
+          </a:fontRef>
+        </p:style>
+        <p:txBody>
+          <a:bodyPr rtlCol="0" anchor="ctr"/>
+          <a:lstStyle/>
+          <a:p>
+            <a:pPr algn="ctr"/>
+            <a:r>
+              <a:rPr lang="en-US" sz="700" dirty="0">
+                <a:solidFill>
+                  <a:schemeClr val="tx1"/>
+                </a:solidFill>
+              </a:rPr>
+              <a:t>IN </a:t>
+            </a:r>
+            <a:endParaRPr lang="bg-BG" sz="700" dirty="0">
+              <a:solidFill>
+                <a:schemeClr val="tx1"/>
+              </a:solidFill>
+            </a:endParaRPr>
+          </a:p>
+        </p:txBody>
+      </p:sp>
+      <p:sp>
+        <p:nvSpPr>
+          <p:cNvPr id="6" name="Arrow: Chevron 5">
+            <a:extLst>
+              <a:ext uri="{FF2B5EF4-FFF2-40B4-BE49-F238E27FC236}">
+                <a16:creationId xmlns:a16="http://schemas.microsoft.com/office/drawing/2014/main" id="{BB2EC374-31DC-5391-08D8-6408388C3F56}"/>
+              </a:ext>
+            </a:extLst>
+          </p:cNvPr>
+          <p:cNvSpPr/>
+          <p:nvPr/>
+        </p:nvSpPr>
+        <p:spPr>
+          <a:xfrm>
+            <a:off x="2435695" y="717550"/>
+            <a:ext cx="682188" cy="380250"/>
+          </a:xfrm>
+          <a:prstGeom prst="chevron">
+            <a:avLst/>
+          </a:prstGeom>
+          <a:solidFill>
+            <a:schemeClr val="bg2">
+              <a:lumMod val="90000"/>
+            </a:schemeClr>
+          </a:solidFill>
+          <a:ln>
+            <a:solidFill>
+              <a:schemeClr val="bg1"/>
+            </a:solidFill>
+          </a:ln>
+        </p:spPr>
+        <p:style>
+          <a:lnRef idx="2">
+            <a:schemeClr val="accent1">
+              <a:shade val="15000"/>
+            </a:schemeClr>
+          </a:lnRef>
+          <a:fillRef idx="1">
+            <a:schemeClr val="accent1"/>
+          </a:fillRef>
+          <a:effectRef idx="0">
+            <a:schemeClr val="accent1"/>
+          </a:effectRef>
+          <a:fontRef idx="minor">
+            <a:schemeClr val="lt1"/>
+          </a:fontRef>
+        </p:style>
+        <p:txBody>
+          <a:bodyPr lIns="0" tIns="0" rIns="0" bIns="0" rtlCol="0" anchor="ctr"/>
+          <a:lstStyle/>
+          <a:p>
+            <a:pPr algn="ctr"/>
+            <a:r>
+              <a:rPr lang="en-US" sz="700" dirty="0">
+                <a:solidFill>
+                  <a:schemeClr val="tx1"/>
+                </a:solidFill>
+              </a:rPr>
+              <a:t>OUT</a:t>
+            </a:r>
+            <a:endParaRPr lang="bg-BG" sz="700" dirty="0">
+              <a:solidFill>
+                <a:schemeClr val="tx1"/>
+              </a:solidFill>
+            </a:endParaRPr>
+          </a:p>
+        </p:txBody>
+      </p:sp>
+      <p:graphicFrame>
+        <p:nvGraphicFramePr>
+          <p:cNvPr id="12" name="Table 11">
+            <a:extLst>
+              <a:ext uri="{FF2B5EF4-FFF2-40B4-BE49-F238E27FC236}">
+                <a16:creationId xmlns:a16="http://schemas.microsoft.com/office/drawing/2014/main" id="{8FE31034-33D2-3B90-557E-4FB722E30E75}"/>
+              </a:ext>
+            </a:extLst>
+          </p:cNvPr>
+          <p:cNvGraphicFramePr>
+            <a:graphicFrameLocks noGrp="1"/>
+          </p:cNvGraphicFramePr>
+          <p:nvPr>
+            <p:extLst>
+              <p:ext uri="{D42A27DB-BD31-4B8C-83A1-F6EECF244321}">
+                <p14:modId xmlns:p14="http://schemas.microsoft.com/office/powerpoint/2010/main" val="30892613"/>
+              </p:ext>
+            </p:extLst>
+          </p:nvPr>
+        </p:nvGraphicFramePr>
+        <p:xfrm>
+          <a:off x="1974243" y="1187450"/>
+          <a:ext cx="1214230" cy="5181540"/>
+        </p:xfrm>
+        <a:graphic>
+          <a:graphicData uri="http://schemas.openxmlformats.org/drawingml/2006/table">
+            <a:tbl>
+              <a:tblPr firstRow="1" bandRow="1">
+                <a:tableStyleId>{5C22544A-7EE6-4342-B048-85BDC9FD1C3A}</a:tableStyleId>
+              </a:tblPr>
+              <a:tblGrid>
+                <a:gridCol w="607115">
+                  <a:extLst>
+                    <a:ext uri="{9D8B030D-6E8A-4147-A177-3AD203B41FA5}">
+                      <a16:colId xmlns:a16="http://schemas.microsoft.com/office/drawing/2014/main" val="2846538363"/>
+                    </a:ext>
+                  </a:extLst>
+                </a:gridCol>
+                <a:gridCol w="607115">
+                  <a:extLst>
+                    <a:ext uri="{9D8B030D-6E8A-4147-A177-3AD203B41FA5}">
+                      <a16:colId xmlns:a16="http://schemas.microsoft.com/office/drawing/2014/main" val="3588707887"/>
+                    </a:ext>
+                  </a:extLst>
+                </a:gridCol>
+              </a:tblGrid>
+              <a:tr h="370110">
+                <a:tc>
+                  <a:txBody>
+                    <a:bodyPr/>
+                    <a:lstStyle/>
+                    <a:p>
+                      <a:endParaRPr lang="bg-BG" dirty="0"/>
+                    </a:p>
+                  </a:txBody>
+                  <a:tcPr>
+                    <a:lnL w="12700" cap="flat" cmpd="sng" algn="ctr">
+                      <a:noFill/>
+                      <a:prstDash val="solid"/>
+                      <a:round/>
+                      <a:headEnd type="none" w="med" len="med"/>
+                      <a:tailEnd type="none" w="med" len="med"/>
+                    </a:lnL>
+                    <a:lnR w="12700" cap="flat" cmpd="sng" algn="ctr">
+                      <a:noFill/>
+                      <a:prstDash val="solid"/>
+                      <a:round/>
+                      <a:headEnd type="none" w="med" len="med"/>
+                      <a:tailEnd type="none" w="med" len="med"/>
+                    </a:lnR>
+                    <a:lnT w="12700" cap="flat" cmpd="sng" algn="ctr">
+                      <a:noFill/>
+                      <a:prstDash val="solid"/>
+                      <a:round/>
+                      <a:headEnd type="none" w="med" len="med"/>
+                      <a:tailEnd type="none" w="med" len="med"/>
+                    </a:lnT>
+                    <a:lnB w="12700" cap="flat" cmpd="sng" algn="ctr">
+                      <a:noFill/>
+                      <a:prstDash val="solid"/>
+                      <a:round/>
+                      <a:headEnd type="none" w="med" len="med"/>
+                      <a:tailEnd type="none" w="med" len="med"/>
+                    </a:lnB>
+                    <a:lnTlToBr w="12700" cmpd="sng">
+                      <a:noFill/>
+                      <a:prstDash val="solid"/>
+                    </a:lnTlToBr>
+                    <a:lnBlToTr w="12700" cmpd="sng">
+                      <a:noFill/>
+                      <a:prstDash val="solid"/>
+                    </a:lnBlToTr>
+                    <a:solidFill>
+                      <a:schemeClr val="tx2">
+                        <a:lumMod val="10000"/>
+                        <a:lumOff val="90000"/>
+                      </a:schemeClr>
+                    </a:solidFill>
+                  </a:tcPr>
+                </a:tc>
+                <a:tc>
+                  <a:txBody>
+                    <a:bodyPr/>
+                    <a:lstStyle/>
+                    <a:p>
+                      <a:endParaRPr lang="bg-BG" dirty="0"/>
+                    </a:p>
+                  </a:txBody>
+                  <a:tcPr>
+                    <a:lnL w="12700" cap="flat" cmpd="sng" algn="ctr">
+                      <a:noFill/>
+                      <a:prstDash val="solid"/>
+                      <a:round/>
+                      <a:headEnd type="none" w="med" len="med"/>
+                      <a:tailEnd type="none" w="med" len="med"/>
+                    </a:lnL>
+                    <a:lnR w="12700" cap="flat" cmpd="sng" algn="ctr">
+                      <a:noFill/>
+                      <a:prstDash val="solid"/>
+                      <a:round/>
+                      <a:headEnd type="none" w="med" len="med"/>
+                      <a:tailEnd type="none" w="med" len="med"/>
+                    </a:lnR>
+                    <a:lnT w="12700" cap="flat" cmpd="sng" algn="ctr">
+                      <a:noFill/>
+                      <a:prstDash val="solid"/>
+                      <a:round/>
+                      <a:headEnd type="none" w="med" len="med"/>
+                      <a:tailEnd type="none" w="med" len="med"/>
+                    </a:lnT>
+                    <a:lnB w="12700" cap="flat" cmpd="sng" algn="ctr">
+                      <a:noFill/>
+                      <a:prstDash val="solid"/>
+                      <a:round/>
+                      <a:headEnd type="none" w="med" len="med"/>
+                      <a:tailEnd type="none" w="med" len="med"/>
+                    </a:lnB>
+                    <a:lnTlToBr w="12700" cmpd="sng">
+                      <a:noFill/>
+                      <a:prstDash val="solid"/>
+                    </a:lnTlToBr>
+                    <a:lnBlToTr w="12700" cmpd="sng">
+                      <a:noFill/>
+                      <a:prstDash val="solid"/>
+                    </a:lnBlToTr>
+                    <a:solidFill>
+                      <a:schemeClr val="bg1"/>
+                    </a:solidFill>
+                  </a:tcPr>
+                </a:tc>
+                <a:extLst>
+                  <a:ext uri="{0D108BD9-81ED-4DB2-BD59-A6C34878D82A}">
+                    <a16:rowId xmlns:a16="http://schemas.microsoft.com/office/drawing/2014/main" val="3844991351"/>
+                  </a:ext>
+                </a:extLst>
+              </a:tr>
+              <a:tr h="370110">
+                <a:tc>
+                  <a:txBody>
+                    <a:bodyPr/>
+                    <a:lstStyle/>
+                    <a:p>
+                      <a:endParaRPr lang="bg-BG" dirty="0"/>
+                    </a:p>
+                  </a:txBody>
+                  <a:tcPr>
+                    <a:lnL w="12700" cap="flat" cmpd="sng" algn="ctr">
+                      <a:noFill/>
+                      <a:prstDash val="solid"/>
+                      <a:round/>
+                      <a:headEnd type="none" w="med" len="med"/>
+                      <a:tailEnd type="none" w="med" len="med"/>
+                    </a:lnL>
+                    <a:lnR w="12700" cap="flat" cmpd="sng" algn="ctr">
+                      <a:noFill/>
+                      <a:prstDash val="solid"/>
+                      <a:round/>
+                      <a:headEnd type="none" w="med" len="med"/>
+                      <a:tailEnd type="none" w="med" len="med"/>
+                    </a:lnR>
+                    <a:lnT w="12700" cap="flat" cmpd="sng" algn="ctr">
+                      <a:noFill/>
+                      <a:prstDash val="solid"/>
+                      <a:round/>
+                      <a:headEnd type="none" w="med" len="med"/>
+                      <a:tailEnd type="none" w="med" len="med"/>
+                    </a:lnT>
+                    <a:lnB w="12700" cap="flat" cmpd="sng" algn="ctr">
+                      <a:noFill/>
+                      <a:prstDash val="solid"/>
+                      <a:round/>
+                      <a:headEnd type="none" w="med" len="med"/>
+                      <a:tailEnd type="none" w="med" len="med"/>
+                    </a:lnB>
+                    <a:lnTlToBr w="12700" cmpd="sng">
+                      <a:noFill/>
+                      <a:prstDash val="solid"/>
+                    </a:lnTlToBr>
+                    <a:lnBlToTr w="12700" cmpd="sng">
+                      <a:noFill/>
+                      <a:prstDash val="solid"/>
+                    </a:lnBlToTr>
+                    <a:solidFill>
+                      <a:schemeClr val="tx2">
+                        <a:lumMod val="10000"/>
+                        <a:lumOff val="90000"/>
+                      </a:schemeClr>
+                    </a:solidFill>
+                  </a:tcPr>
+                </a:tc>
+                <a:tc>
+                  <a:txBody>
+                    <a:bodyPr/>
+                    <a:lstStyle/>
+                    <a:p>
+                      <a:endParaRPr lang="bg-BG" dirty="0"/>
+                    </a:p>
+                  </a:txBody>
+                  <a:tcPr>
+                    <a:lnL w="12700" cap="flat" cmpd="sng" algn="ctr">
+                      <a:noFill/>
+                      <a:prstDash val="solid"/>
+                      <a:round/>
+                      <a:headEnd type="none" w="med" len="med"/>
+                      <a:tailEnd type="none" w="med" len="med"/>
+                    </a:lnL>
+                    <a:lnR w="12700" cap="flat" cmpd="sng" algn="ctr">
+                      <a:noFill/>
+                      <a:prstDash val="solid"/>
+                      <a:round/>
+                      <a:headEnd type="none" w="med" len="med"/>
+                      <a:tailEnd type="none" w="med" len="med"/>
+                    </a:lnR>
+                    <a:lnT w="12700" cap="flat" cmpd="sng" algn="ctr">
+                      <a:noFill/>
+                      <a:prstDash val="solid"/>
+                      <a:round/>
+                      <a:headEnd type="none" w="med" len="med"/>
+                      <a:tailEnd type="none" w="med" len="med"/>
+                    </a:lnT>
+                    <a:lnB w="12700" cap="flat" cmpd="sng" algn="ctr">
+                      <a:noFill/>
+                      <a:prstDash val="solid"/>
+                      <a:round/>
+                      <a:headEnd type="none" w="med" len="med"/>
+                      <a:tailEnd type="none" w="med" len="med"/>
+                    </a:lnB>
+                    <a:lnTlToBr w="12700" cmpd="sng">
+                      <a:noFill/>
+                      <a:prstDash val="solid"/>
+                    </a:lnTlToBr>
+                    <a:lnBlToTr w="12700" cmpd="sng">
+                      <a:noFill/>
+                      <a:prstDash val="solid"/>
+                    </a:lnBlToTr>
+                    <a:solidFill>
+                      <a:schemeClr val="bg1"/>
+                    </a:solidFill>
+                  </a:tcPr>
+                </a:tc>
+                <a:extLst>
+                  <a:ext uri="{0D108BD9-81ED-4DB2-BD59-A6C34878D82A}">
+                    <a16:rowId xmlns:a16="http://schemas.microsoft.com/office/drawing/2014/main" val="2167118909"/>
+                  </a:ext>
+                </a:extLst>
+              </a:tr>
+              <a:tr h="370110">
+                <a:tc>
+                  <a:txBody>
+                    <a:bodyPr/>
+                    <a:lstStyle/>
+                    <a:p>
+                      <a:endParaRPr lang="bg-BG" dirty="0"/>
+                    </a:p>
+                  </a:txBody>
+                  <a:tcPr>
+                    <a:lnL w="12700" cap="flat" cmpd="sng" algn="ctr">
+                      <a:noFill/>
+                      <a:prstDash val="solid"/>
+                      <a:round/>
+                      <a:headEnd type="none" w="med" len="med"/>
+                      <a:tailEnd type="none" w="med" len="med"/>
+                    </a:lnL>
+                    <a:lnR w="12700" cap="flat" cmpd="sng" algn="ctr">
+                      <a:noFill/>
+                      <a:prstDash val="solid"/>
+                      <a:round/>
+                      <a:headEnd type="none" w="med" len="med"/>
+                      <a:tailEnd type="none" w="med" len="med"/>
+                    </a:lnR>
+                    <a:lnT w="12700" cap="flat" cmpd="sng" algn="ctr">
+                      <a:noFill/>
+                      <a:prstDash val="solid"/>
+                      <a:round/>
+                      <a:headEnd type="none" w="med" len="med"/>
+                      <a:tailEnd type="none" w="med" len="med"/>
+                    </a:lnT>
+                    <a:lnB w="12700" cap="flat" cmpd="sng" algn="ctr">
+                      <a:noFill/>
+                      <a:prstDash val="solid"/>
+                      <a:round/>
+                      <a:headEnd type="none" w="med" len="med"/>
+                      <a:tailEnd type="none" w="med" len="med"/>
+                    </a:lnB>
+                    <a:lnTlToBr w="12700" cmpd="sng">
+                      <a:noFill/>
+                      <a:prstDash val="solid"/>
+                    </a:lnTlToBr>
+                    <a:lnBlToTr w="12700" cmpd="sng">
+                      <a:noFill/>
+                      <a:prstDash val="solid"/>
+                    </a:lnBlToTr>
+                    <a:solidFill>
+                      <a:schemeClr val="tx2">
+                        <a:lumMod val="10000"/>
+                        <a:lumOff val="90000"/>
+                      </a:schemeClr>
+                    </a:solidFill>
+                  </a:tcPr>
+                </a:tc>
+                <a:tc>
+                  <a:txBody>
+                    <a:bodyPr/>
+                    <a:lstStyle/>
+                    <a:p>
+                      <a:endParaRPr lang="bg-BG" dirty="0"/>
+                    </a:p>
+                  </a:txBody>
+                  <a:tcPr>
+                    <a:lnL w="12700" cap="flat" cmpd="sng" algn="ctr">
+                      <a:noFill/>
+                      <a:prstDash val="solid"/>
+                      <a:round/>
+                      <a:headEnd type="none" w="med" len="med"/>
+                      <a:tailEnd type="none" w="med" len="med"/>
+                    </a:lnL>
+                    <a:lnR w="12700" cap="flat" cmpd="sng" algn="ctr">
+                      <a:noFill/>
+                      <a:prstDash val="solid"/>
+                      <a:round/>
+                      <a:headEnd type="none" w="med" len="med"/>
+                      <a:tailEnd type="none" w="med" len="med"/>
+                    </a:lnR>
+                    <a:lnT w="12700" cap="flat" cmpd="sng" algn="ctr">
+                      <a:noFill/>
+                      <a:prstDash val="solid"/>
+                      <a:round/>
+                      <a:headEnd type="none" w="med" len="med"/>
+                      <a:tailEnd type="none" w="med" len="med"/>
+                    </a:lnT>
+                    <a:lnB w="12700" cap="flat" cmpd="sng" algn="ctr">
+                      <a:noFill/>
+                      <a:prstDash val="solid"/>
+                      <a:round/>
+                      <a:headEnd type="none" w="med" len="med"/>
+                      <a:tailEnd type="none" w="med" len="med"/>
+                    </a:lnB>
+                    <a:lnTlToBr w="12700" cmpd="sng">
+                      <a:noFill/>
+                      <a:prstDash val="solid"/>
+                    </a:lnTlToBr>
+                    <a:lnBlToTr w="12700" cmpd="sng">
+                      <a:noFill/>
+                      <a:prstDash val="solid"/>
+                    </a:lnBlToTr>
+                    <a:solidFill>
+                      <a:schemeClr val="bg1"/>
+                    </a:solidFill>
+                  </a:tcPr>
+                </a:tc>
+                <a:extLst>
+                  <a:ext uri="{0D108BD9-81ED-4DB2-BD59-A6C34878D82A}">
+                    <a16:rowId xmlns:a16="http://schemas.microsoft.com/office/drawing/2014/main" val="530944329"/>
+                  </a:ext>
+                </a:extLst>
+              </a:tr>
+              <a:tr h="370110">
+                <a:tc>
+                  <a:txBody>
+                    <a:bodyPr/>
+                    <a:lstStyle/>
+                    <a:p>
+                      <a:endParaRPr lang="bg-BG" dirty="0"/>
+                    </a:p>
+                  </a:txBody>
+                  <a:tcPr>
+                    <a:lnL w="12700" cap="flat" cmpd="sng" algn="ctr">
+                      <a:noFill/>
+                      <a:prstDash val="solid"/>
+                      <a:round/>
+                      <a:headEnd type="none" w="med" len="med"/>
+                      <a:tailEnd type="none" w="med" len="med"/>
+                    </a:lnL>
+                    <a:lnR w="12700" cap="flat" cmpd="sng" algn="ctr">
+                      <a:noFill/>
+                      <a:prstDash val="solid"/>
+                      <a:round/>
+                      <a:headEnd type="none" w="med" len="med"/>
+                      <a:tailEnd type="none" w="med" len="med"/>
+                    </a:lnR>
+                    <a:lnT w="12700" cap="flat" cmpd="sng" algn="ctr">
+                      <a:noFill/>
+                      <a:prstDash val="solid"/>
+                      <a:round/>
+                      <a:headEnd type="none" w="med" len="med"/>
+                      <a:tailEnd type="none" w="med" len="med"/>
+                    </a:lnT>
+                    <a:lnB w="12700" cap="flat" cmpd="sng" algn="ctr">
+                      <a:noFill/>
+                      <a:prstDash val="solid"/>
+                      <a:round/>
+                      <a:headEnd type="none" w="med" len="med"/>
+                      <a:tailEnd type="none" w="med" len="med"/>
+                    </a:lnB>
+                    <a:lnTlToBr w="12700" cmpd="sng">
+                      <a:noFill/>
+                      <a:prstDash val="solid"/>
+                    </a:lnTlToBr>
+                    <a:lnBlToTr w="12700" cmpd="sng">
+                      <a:noFill/>
+                      <a:prstDash val="solid"/>
+                    </a:lnBlToTr>
+                    <a:solidFill>
+                      <a:schemeClr val="tx2">
+                        <a:lumMod val="10000"/>
+                        <a:lumOff val="90000"/>
+                      </a:schemeClr>
+                    </a:solidFill>
+                  </a:tcPr>
+                </a:tc>
+                <a:tc>
+                  <a:txBody>
+                    <a:bodyPr/>
+                    <a:lstStyle/>
+                    <a:p>
+                      <a:endParaRPr lang="bg-BG" dirty="0"/>
+                    </a:p>
+                  </a:txBody>
+                  <a:tcPr>
+                    <a:lnL w="12700" cap="flat" cmpd="sng" algn="ctr">
+                      <a:noFill/>
+                      <a:prstDash val="solid"/>
+                      <a:round/>
+                      <a:headEnd type="none" w="med" len="med"/>
+                      <a:tailEnd type="none" w="med" len="med"/>
+                    </a:lnL>
+                    <a:lnR w="12700" cap="flat" cmpd="sng" algn="ctr">
+                      <a:noFill/>
+                      <a:prstDash val="solid"/>
+                      <a:round/>
+                      <a:headEnd type="none" w="med" len="med"/>
+                      <a:tailEnd type="none" w="med" len="med"/>
+                    </a:lnR>
+                    <a:lnT w="12700" cap="flat" cmpd="sng" algn="ctr">
+                      <a:noFill/>
+                      <a:prstDash val="solid"/>
+                      <a:round/>
+                      <a:headEnd type="none" w="med" len="med"/>
+                      <a:tailEnd type="none" w="med" len="med"/>
+                    </a:lnT>
+                    <a:lnB w="12700" cap="flat" cmpd="sng" algn="ctr">
+                      <a:noFill/>
+                      <a:prstDash val="solid"/>
+                      <a:round/>
+                      <a:headEnd type="none" w="med" len="med"/>
+                      <a:tailEnd type="none" w="med" len="med"/>
+                    </a:lnB>
+                    <a:lnTlToBr w="12700" cmpd="sng">
+                      <a:noFill/>
+                      <a:prstDash val="solid"/>
+                    </a:lnTlToBr>
+                    <a:lnBlToTr w="12700" cmpd="sng">
+                      <a:noFill/>
+                      <a:prstDash val="solid"/>
+                    </a:lnBlToTr>
+                    <a:solidFill>
+                      <a:schemeClr val="bg1"/>
+                    </a:solidFill>
+                  </a:tcPr>
+                </a:tc>
+                <a:extLst>
+                  <a:ext uri="{0D108BD9-81ED-4DB2-BD59-A6C34878D82A}">
+                    <a16:rowId xmlns:a16="http://schemas.microsoft.com/office/drawing/2014/main" val="3195393496"/>
+                  </a:ext>
+                </a:extLst>
+              </a:tr>
+              <a:tr h="370110">
+                <a:tc>
+                  <a:txBody>
+                    <a:bodyPr/>
+                    <a:lstStyle/>
+                    <a:p>
+                      <a:endParaRPr lang="bg-BG" dirty="0"/>
+                    </a:p>
+                  </a:txBody>
+                  <a:tcPr>
+                    <a:lnL w="12700" cap="flat" cmpd="sng" algn="ctr">
+                      <a:noFill/>
+                      <a:prstDash val="solid"/>
+                      <a:round/>
+                      <a:headEnd type="none" w="med" len="med"/>
+                      <a:tailEnd type="none" w="med" len="med"/>
+                    </a:lnL>
+                    <a:lnR w="12700" cap="flat" cmpd="sng" algn="ctr">
+                      <a:noFill/>
+                      <a:prstDash val="solid"/>
+                      <a:round/>
+                      <a:headEnd type="none" w="med" len="med"/>
+                      <a:tailEnd type="none" w="med" len="med"/>
+                    </a:lnR>
+                    <a:lnT w="12700" cap="flat" cmpd="sng" algn="ctr">
+                      <a:noFill/>
+                      <a:prstDash val="solid"/>
+                      <a:round/>
+                      <a:headEnd type="none" w="med" len="med"/>
+                      <a:tailEnd type="none" w="med" len="med"/>
+                    </a:lnT>
+                    <a:lnB w="12700" cap="flat" cmpd="sng" algn="ctr">
+                      <a:noFill/>
+                      <a:prstDash val="solid"/>
+                      <a:round/>
+                      <a:headEnd type="none" w="med" len="med"/>
+                      <a:tailEnd type="none" w="med" len="med"/>
+                    </a:lnB>
+                    <a:lnTlToBr w="12700" cmpd="sng">
+                      <a:noFill/>
+                      <a:prstDash val="solid"/>
+                    </a:lnTlToBr>
+                    <a:lnBlToTr w="12700" cmpd="sng">
+                      <a:noFill/>
+                      <a:prstDash val="solid"/>
+                    </a:lnBlToTr>
+                    <a:solidFill>
+                      <a:schemeClr val="tx2">
+                        <a:lumMod val="10000"/>
+                        <a:lumOff val="90000"/>
+                      </a:schemeClr>
+                    </a:solidFill>
+                  </a:tcPr>
+                </a:tc>
+                <a:tc>
+                  <a:txBody>
+                    <a:bodyPr/>
+                    <a:lstStyle/>
+                    <a:p>
+                      <a:endParaRPr lang="bg-BG" dirty="0"/>
+                    </a:p>
+                  </a:txBody>
+                  <a:tcPr>
+                    <a:lnL w="12700" cap="flat" cmpd="sng" algn="ctr">
+                      <a:noFill/>
+                      <a:prstDash val="solid"/>
+                      <a:round/>
+                      <a:headEnd type="none" w="med" len="med"/>
+                      <a:tailEnd type="none" w="med" len="med"/>
+                    </a:lnL>
+                    <a:lnR w="12700" cap="flat" cmpd="sng" algn="ctr">
+                      <a:noFill/>
+                      <a:prstDash val="solid"/>
+                      <a:round/>
+                      <a:headEnd type="none" w="med" len="med"/>
+                      <a:tailEnd type="none" w="med" len="med"/>
+                    </a:lnR>
+                    <a:lnT w="12700" cap="flat" cmpd="sng" algn="ctr">
+                      <a:noFill/>
+                      <a:prstDash val="solid"/>
+                      <a:round/>
+                      <a:headEnd type="none" w="med" len="med"/>
+                      <a:tailEnd type="none" w="med" len="med"/>
+                    </a:lnT>
+                    <a:lnB w="12700" cap="flat" cmpd="sng" algn="ctr">
+                      <a:noFill/>
+                      <a:prstDash val="solid"/>
+                      <a:round/>
+                      <a:headEnd type="none" w="med" len="med"/>
+                      <a:tailEnd type="none" w="med" len="med"/>
+                    </a:lnB>
+                    <a:lnTlToBr w="12700" cmpd="sng">
+                      <a:noFill/>
+                      <a:prstDash val="solid"/>
+                    </a:lnTlToBr>
+                    <a:lnBlToTr w="12700" cmpd="sng">
+                      <a:noFill/>
+                      <a:prstDash val="solid"/>
+                    </a:lnBlToTr>
+                    <a:solidFill>
+                      <a:schemeClr val="bg1"/>
+                    </a:solidFill>
+                  </a:tcPr>
+                </a:tc>
+                <a:extLst>
+                  <a:ext uri="{0D108BD9-81ED-4DB2-BD59-A6C34878D82A}">
+                    <a16:rowId xmlns:a16="http://schemas.microsoft.com/office/drawing/2014/main" val="2984979433"/>
+                  </a:ext>
+                </a:extLst>
+              </a:tr>
+              <a:tr h="370110">
+                <a:tc>
+                  <a:txBody>
+                    <a:bodyPr/>
+                    <a:lstStyle/>
+                    <a:p>
+                      <a:endParaRPr lang="bg-BG" dirty="0"/>
+                    </a:p>
+                  </a:txBody>
+                  <a:tcPr>
+                    <a:lnL w="12700" cap="flat" cmpd="sng" algn="ctr">
+                      <a:noFill/>
+                      <a:prstDash val="solid"/>
+                      <a:round/>
+                      <a:headEnd type="none" w="med" len="med"/>
+                      <a:tailEnd type="none" w="med" len="med"/>
+                    </a:lnL>
+                    <a:lnR w="12700" cap="flat" cmpd="sng" algn="ctr">
+                      <a:noFill/>
+                      <a:prstDash val="solid"/>
+                      <a:round/>
+                      <a:headEnd type="none" w="med" len="med"/>
+                      <a:tailEnd type="none" w="med" len="med"/>
+                    </a:lnR>
+                    <a:lnT w="12700" cap="flat" cmpd="sng" algn="ctr">
+                      <a:noFill/>
+                      <a:prstDash val="solid"/>
+                      <a:round/>
+                      <a:headEnd type="none" w="med" len="med"/>
+                      <a:tailEnd type="none" w="med" len="med"/>
+                    </a:lnT>
+                    <a:lnB w="12700" cap="flat" cmpd="sng" algn="ctr">
+                      <a:noFill/>
+                      <a:prstDash val="solid"/>
+                      <a:round/>
+                      <a:headEnd type="none" w="med" len="med"/>
+                      <a:tailEnd type="none" w="med" len="med"/>
+                    </a:lnB>
+                    <a:lnTlToBr w="12700" cmpd="sng">
+                      <a:noFill/>
+                      <a:prstDash val="solid"/>
+                    </a:lnTlToBr>
+                    <a:lnBlToTr w="12700" cmpd="sng">
+                      <a:noFill/>
+                      <a:prstDash val="solid"/>
+                    </a:lnBlToTr>
+                    <a:solidFill>
+                      <a:schemeClr val="tx2">
+                        <a:lumMod val="10000"/>
+                        <a:lumOff val="90000"/>
+                      </a:schemeClr>
+                    </a:solidFill>
+                  </a:tcPr>
+                </a:tc>
+                <a:tc>
+                  <a:txBody>
+                    <a:bodyPr/>
+                    <a:lstStyle/>
+                    <a:p>
+                      <a:endParaRPr lang="bg-BG" dirty="0"/>
+                    </a:p>
+                  </a:txBody>
+                  <a:tcPr>
+                    <a:lnL w="12700" cap="flat" cmpd="sng" algn="ctr">
+                      <a:noFill/>
+                      <a:prstDash val="solid"/>
+                      <a:round/>
+                      <a:headEnd type="none" w="med" len="med"/>
+                      <a:tailEnd type="none" w="med" len="med"/>
+                    </a:lnL>
+                    <a:lnR w="12700" cap="flat" cmpd="sng" algn="ctr">
+                      <a:noFill/>
+                      <a:prstDash val="solid"/>
+                      <a:round/>
+                      <a:headEnd type="none" w="med" len="med"/>
+                      <a:tailEnd type="none" w="med" len="med"/>
+                    </a:lnR>
+                    <a:lnT w="12700" cap="flat" cmpd="sng" algn="ctr">
+                      <a:noFill/>
+                      <a:prstDash val="solid"/>
+                      <a:round/>
+                      <a:headEnd type="none" w="med" len="med"/>
+                      <a:tailEnd type="none" w="med" len="med"/>
+                    </a:lnT>
+                    <a:lnB w="12700" cap="flat" cmpd="sng" algn="ctr">
+                      <a:noFill/>
+                      <a:prstDash val="solid"/>
+                      <a:round/>
+                      <a:headEnd type="none" w="med" len="med"/>
+                      <a:tailEnd type="none" w="med" len="med"/>
+                    </a:lnB>
+                    <a:lnTlToBr w="12700" cmpd="sng">
+                      <a:noFill/>
+                      <a:prstDash val="solid"/>
+                    </a:lnTlToBr>
+                    <a:lnBlToTr w="12700" cmpd="sng">
+                      <a:noFill/>
+                      <a:prstDash val="solid"/>
+                    </a:lnBlToTr>
+                    <a:solidFill>
+                      <a:schemeClr val="bg1"/>
+                    </a:solidFill>
+                  </a:tcPr>
+                </a:tc>
+                <a:extLst>
+                  <a:ext uri="{0D108BD9-81ED-4DB2-BD59-A6C34878D82A}">
+                    <a16:rowId xmlns:a16="http://schemas.microsoft.com/office/drawing/2014/main" val="1374873194"/>
+                  </a:ext>
+                </a:extLst>
+              </a:tr>
+              <a:tr h="370110">
+                <a:tc>
+                  <a:txBody>
+                    <a:bodyPr/>
+                    <a:lstStyle/>
+                    <a:p>
+                      <a:endParaRPr lang="bg-BG" dirty="0"/>
+                    </a:p>
+                  </a:txBody>
+                  <a:tcPr>
+                    <a:lnL w="12700" cap="flat" cmpd="sng" algn="ctr">
+                      <a:noFill/>
+                      <a:prstDash val="solid"/>
+                      <a:round/>
+                      <a:headEnd type="none" w="med" len="med"/>
+                      <a:tailEnd type="none" w="med" len="med"/>
+                    </a:lnL>
+                    <a:lnR w="12700" cap="flat" cmpd="sng" algn="ctr">
+                      <a:noFill/>
+                      <a:prstDash val="solid"/>
+                      <a:round/>
+                      <a:headEnd type="none" w="med" len="med"/>
+                      <a:tailEnd type="none" w="med" len="med"/>
+                    </a:lnR>
+                    <a:lnT w="12700" cap="flat" cmpd="sng" algn="ctr">
+                      <a:noFill/>
+                      <a:prstDash val="solid"/>
+                      <a:round/>
+                      <a:headEnd type="none" w="med" len="med"/>
+                      <a:tailEnd type="none" w="med" len="med"/>
+                    </a:lnT>
+                    <a:lnB w="12700" cap="flat" cmpd="sng" algn="ctr">
+                      <a:noFill/>
+                      <a:prstDash val="solid"/>
+                      <a:round/>
+                      <a:headEnd type="none" w="med" len="med"/>
+                      <a:tailEnd type="none" w="med" len="med"/>
+                    </a:lnB>
+                    <a:lnTlToBr w="12700" cmpd="sng">
+                      <a:noFill/>
+                      <a:prstDash val="solid"/>
+                    </a:lnTlToBr>
+                    <a:lnBlToTr w="12700" cmpd="sng">
+                      <a:noFill/>
+                      <a:prstDash val="solid"/>
+                    </a:lnBlToTr>
+                    <a:solidFill>
+                      <a:schemeClr val="tx2">
+                        <a:lumMod val="10000"/>
+                        <a:lumOff val="90000"/>
+                      </a:schemeClr>
+                    </a:solidFill>
+                  </a:tcPr>
+                </a:tc>
+                <a:tc>
+                  <a:txBody>
+                    <a:bodyPr/>
+                    <a:lstStyle/>
+                    <a:p>
+                      <a:endParaRPr lang="bg-BG" dirty="0"/>
+                    </a:p>
+                  </a:txBody>
+                  <a:tcPr>
+                    <a:lnL w="12700" cap="flat" cmpd="sng" algn="ctr">
+                      <a:noFill/>
+                      <a:prstDash val="solid"/>
+                      <a:round/>
+                      <a:headEnd type="none" w="med" len="med"/>
+                      <a:tailEnd type="none" w="med" len="med"/>
+                    </a:lnL>
+                    <a:lnR w="12700" cap="flat" cmpd="sng" algn="ctr">
+                      <a:noFill/>
+                      <a:prstDash val="solid"/>
+                      <a:round/>
+                      <a:headEnd type="none" w="med" len="med"/>
+                      <a:tailEnd type="none" w="med" len="med"/>
+                    </a:lnR>
+                    <a:lnT w="12700" cap="flat" cmpd="sng" algn="ctr">
+                      <a:noFill/>
+                      <a:prstDash val="solid"/>
+                      <a:round/>
+                      <a:headEnd type="none" w="med" len="med"/>
+                      <a:tailEnd type="none" w="med" len="med"/>
+                    </a:lnT>
+                    <a:lnB w="12700" cap="flat" cmpd="sng" algn="ctr">
+                      <a:noFill/>
+                      <a:prstDash val="solid"/>
+                      <a:round/>
+                      <a:headEnd type="none" w="med" len="med"/>
+                      <a:tailEnd type="none" w="med" len="med"/>
+                    </a:lnB>
+                    <a:lnTlToBr w="12700" cmpd="sng">
+                      <a:noFill/>
+                      <a:prstDash val="solid"/>
+                    </a:lnTlToBr>
+                    <a:lnBlToTr w="12700" cmpd="sng">
+                      <a:noFill/>
+                      <a:prstDash val="solid"/>
+                    </a:lnBlToTr>
+                    <a:solidFill>
+                      <a:schemeClr val="bg1"/>
+                    </a:solidFill>
+                  </a:tcPr>
+                </a:tc>
+                <a:extLst>
+                  <a:ext uri="{0D108BD9-81ED-4DB2-BD59-A6C34878D82A}">
+                    <a16:rowId xmlns:a16="http://schemas.microsoft.com/office/drawing/2014/main" val="3312316575"/>
+                  </a:ext>
+                </a:extLst>
+              </a:tr>
+              <a:tr h="370110">
+                <a:tc>
+                  <a:txBody>
+                    <a:bodyPr/>
+                    <a:lstStyle/>
+                    <a:p>
+                      <a:endParaRPr lang="bg-BG" dirty="0"/>
+                    </a:p>
+                  </a:txBody>
+                  <a:tcPr>
+                    <a:lnL w="12700" cap="flat" cmpd="sng" algn="ctr">
+                      <a:noFill/>
+                      <a:prstDash val="solid"/>
+                      <a:round/>
+                      <a:headEnd type="none" w="med" len="med"/>
+                      <a:tailEnd type="none" w="med" len="med"/>
+                    </a:lnL>
+                    <a:lnR w="12700" cap="flat" cmpd="sng" algn="ctr">
+                      <a:noFill/>
+                      <a:prstDash val="solid"/>
+                      <a:round/>
+                      <a:headEnd type="none" w="med" len="med"/>
+                      <a:tailEnd type="none" w="med" len="med"/>
+                    </a:lnR>
+                    <a:lnT w="12700" cap="flat" cmpd="sng" algn="ctr">
+                      <a:noFill/>
+                      <a:prstDash val="solid"/>
+                      <a:round/>
+                      <a:headEnd type="none" w="med" len="med"/>
+                      <a:tailEnd type="none" w="med" len="med"/>
+                    </a:lnT>
+                    <a:lnB w="12700" cap="flat" cmpd="sng" algn="ctr">
+                      <a:noFill/>
+                      <a:prstDash val="solid"/>
+                      <a:round/>
+                      <a:headEnd type="none" w="med" len="med"/>
+                      <a:tailEnd type="none" w="med" len="med"/>
+                    </a:lnB>
+                    <a:lnTlToBr w="12700" cmpd="sng">
+                      <a:noFill/>
+                      <a:prstDash val="solid"/>
+                    </a:lnTlToBr>
+                    <a:lnBlToTr w="12700" cmpd="sng">
+                      <a:noFill/>
+                      <a:prstDash val="solid"/>
+                    </a:lnBlToTr>
+                    <a:solidFill>
+                      <a:schemeClr val="tx2">
+                        <a:lumMod val="10000"/>
+                        <a:lumOff val="90000"/>
+                      </a:schemeClr>
+                    </a:solidFill>
+                  </a:tcPr>
+                </a:tc>
+                <a:tc>
+                  <a:txBody>
+                    <a:bodyPr/>
+                    <a:lstStyle/>
+                    <a:p>
+                      <a:endParaRPr lang="bg-BG" dirty="0"/>
+                    </a:p>
+                  </a:txBody>
+                  <a:tcPr>
+                    <a:lnL w="12700" cap="flat" cmpd="sng" algn="ctr">
+                      <a:noFill/>
+                      <a:prstDash val="solid"/>
+                      <a:round/>
+                      <a:headEnd type="none" w="med" len="med"/>
+                      <a:tailEnd type="none" w="med" len="med"/>
+                    </a:lnL>
+                    <a:lnR w="12700" cap="flat" cmpd="sng" algn="ctr">
+                      <a:noFill/>
+                      <a:prstDash val="solid"/>
+                      <a:round/>
+                      <a:headEnd type="none" w="med" len="med"/>
+                      <a:tailEnd type="none" w="med" len="med"/>
+                    </a:lnR>
+                    <a:lnT w="12700" cap="flat" cmpd="sng" algn="ctr">
+                      <a:noFill/>
+                      <a:prstDash val="solid"/>
+                      <a:round/>
+                      <a:headEnd type="none" w="med" len="med"/>
+                      <a:tailEnd type="none" w="med" len="med"/>
+                    </a:lnT>
+                    <a:lnB w="12700" cap="flat" cmpd="sng" algn="ctr">
+                      <a:noFill/>
+                      <a:prstDash val="solid"/>
+                      <a:round/>
+                      <a:headEnd type="none" w="med" len="med"/>
+                      <a:tailEnd type="none" w="med" len="med"/>
+                    </a:lnB>
+                    <a:lnTlToBr w="12700" cmpd="sng">
+                      <a:noFill/>
+                      <a:prstDash val="solid"/>
+                    </a:lnTlToBr>
+                    <a:lnBlToTr w="12700" cmpd="sng">
+                      <a:noFill/>
+                      <a:prstDash val="solid"/>
+                    </a:lnBlToTr>
+                    <a:solidFill>
+                      <a:schemeClr val="bg1"/>
+                    </a:solidFill>
+                  </a:tcPr>
+                </a:tc>
+                <a:extLst>
+                  <a:ext uri="{0D108BD9-81ED-4DB2-BD59-A6C34878D82A}">
+                    <a16:rowId xmlns:a16="http://schemas.microsoft.com/office/drawing/2014/main" val="357350041"/>
+                  </a:ext>
+                </a:extLst>
+              </a:tr>
+              <a:tr h="370110">
+                <a:tc>
+                  <a:txBody>
+                    <a:bodyPr/>
+                    <a:lstStyle/>
+                    <a:p>
+                      <a:endParaRPr lang="bg-BG" dirty="0"/>
+                    </a:p>
+                  </a:txBody>
+                  <a:tcPr>
+                    <a:lnL w="12700" cap="flat" cmpd="sng" algn="ctr">
+                      <a:noFill/>
+                      <a:prstDash val="solid"/>
+                      <a:round/>
+                      <a:headEnd type="none" w="med" len="med"/>
+                      <a:tailEnd type="none" w="med" len="med"/>
+                    </a:lnL>
+                    <a:lnR w="12700" cap="flat" cmpd="sng" algn="ctr">
+                      <a:noFill/>
+                      <a:prstDash val="solid"/>
+                      <a:round/>
+                      <a:headEnd type="none" w="med" len="med"/>
+                      <a:tailEnd type="none" w="med" len="med"/>
+                    </a:lnR>
+                    <a:lnT w="12700" cap="flat" cmpd="sng" algn="ctr">
+                      <a:noFill/>
+                      <a:prstDash val="solid"/>
+                      <a:round/>
+                      <a:headEnd type="none" w="med" len="med"/>
+                      <a:tailEnd type="none" w="med" len="med"/>
+                    </a:lnT>
+                    <a:lnB w="12700" cap="flat" cmpd="sng" algn="ctr">
+                      <a:noFill/>
+                      <a:prstDash val="solid"/>
+                      <a:round/>
+                      <a:headEnd type="none" w="med" len="med"/>
+                      <a:tailEnd type="none" w="med" len="med"/>
+                    </a:lnB>
+                    <a:lnTlToBr w="12700" cmpd="sng">
+                      <a:noFill/>
+                      <a:prstDash val="solid"/>
+                    </a:lnTlToBr>
+                    <a:lnBlToTr w="12700" cmpd="sng">
+                      <a:noFill/>
+                      <a:prstDash val="solid"/>
+                    </a:lnBlToTr>
+                    <a:solidFill>
+                      <a:schemeClr val="tx2">
+                        <a:lumMod val="10000"/>
+                        <a:lumOff val="90000"/>
+                      </a:schemeClr>
+                    </a:solidFill>
+                  </a:tcPr>
+                </a:tc>
+                <a:tc>
+                  <a:txBody>
+                    <a:bodyPr/>
+                    <a:lstStyle/>
+                    <a:p>
+                      <a:endParaRPr lang="bg-BG" dirty="0"/>
+                    </a:p>
+                  </a:txBody>
+                  <a:tcPr>
+                    <a:lnL w="12700" cap="flat" cmpd="sng" algn="ctr">
+                      <a:noFill/>
+                      <a:prstDash val="solid"/>
+                      <a:round/>
+                      <a:headEnd type="none" w="med" len="med"/>
+                      <a:tailEnd type="none" w="med" len="med"/>
+                    </a:lnL>
+                    <a:lnR w="12700" cap="flat" cmpd="sng" algn="ctr">
+                      <a:noFill/>
+                      <a:prstDash val="solid"/>
+                      <a:round/>
+                      <a:headEnd type="none" w="med" len="med"/>
+                      <a:tailEnd type="none" w="med" len="med"/>
+                    </a:lnR>
+                    <a:lnT w="12700" cap="flat" cmpd="sng" algn="ctr">
+                      <a:noFill/>
+                      <a:prstDash val="solid"/>
+                      <a:round/>
+                      <a:headEnd type="none" w="med" len="med"/>
+                      <a:tailEnd type="none" w="med" len="med"/>
+                    </a:lnT>
+                    <a:lnB w="12700" cap="flat" cmpd="sng" algn="ctr">
+                      <a:noFill/>
+                      <a:prstDash val="solid"/>
+                      <a:round/>
+                      <a:headEnd type="none" w="med" len="med"/>
+                      <a:tailEnd type="none" w="med" len="med"/>
+                    </a:lnB>
+                    <a:lnTlToBr w="12700" cmpd="sng">
+                      <a:noFill/>
+                      <a:prstDash val="solid"/>
+                    </a:lnTlToBr>
+                    <a:lnBlToTr w="12700" cmpd="sng">
+                      <a:noFill/>
+                      <a:prstDash val="solid"/>
+                    </a:lnBlToTr>
+                    <a:solidFill>
+                      <a:schemeClr val="bg1"/>
+                    </a:solidFill>
+                  </a:tcPr>
+                </a:tc>
+                <a:extLst>
+                  <a:ext uri="{0D108BD9-81ED-4DB2-BD59-A6C34878D82A}">
+                    <a16:rowId xmlns:a16="http://schemas.microsoft.com/office/drawing/2014/main" val="3660953754"/>
+                  </a:ext>
+                </a:extLst>
+              </a:tr>
+              <a:tr h="370110">
+                <a:tc>
+                  <a:txBody>
+                    <a:bodyPr/>
+                    <a:lstStyle/>
+                    <a:p>
+                      <a:endParaRPr lang="bg-BG" dirty="0"/>
+                    </a:p>
+                  </a:txBody>
+                  <a:tcPr>
+                    <a:lnL w="12700" cap="flat" cmpd="sng" algn="ctr">
+                      <a:noFill/>
+                      <a:prstDash val="solid"/>
+                      <a:round/>
+                      <a:headEnd type="none" w="med" len="med"/>
+                      <a:tailEnd type="none" w="med" len="med"/>
+                    </a:lnL>
+                    <a:lnR w="12700" cap="flat" cmpd="sng" algn="ctr">
+                      <a:noFill/>
+                      <a:prstDash val="solid"/>
+                      <a:round/>
+                      <a:headEnd type="none" w="med" len="med"/>
+                      <a:tailEnd type="none" w="med" len="med"/>
+                    </a:lnR>
+                    <a:lnT w="12700" cap="flat" cmpd="sng" algn="ctr">
+                      <a:noFill/>
+                      <a:prstDash val="solid"/>
+                      <a:round/>
+                      <a:headEnd type="none" w="med" len="med"/>
+                      <a:tailEnd type="none" w="med" len="med"/>
+                    </a:lnT>
+                    <a:lnB w="12700" cap="flat" cmpd="sng" algn="ctr">
+                      <a:noFill/>
+                      <a:prstDash val="solid"/>
+                      <a:round/>
+                      <a:headEnd type="none" w="med" len="med"/>
+                      <a:tailEnd type="none" w="med" len="med"/>
+                    </a:lnB>
+                    <a:lnTlToBr w="12700" cmpd="sng">
+                      <a:noFill/>
+                      <a:prstDash val="solid"/>
+                    </a:lnTlToBr>
+                    <a:lnBlToTr w="12700" cmpd="sng">
+                      <a:noFill/>
+                      <a:prstDash val="solid"/>
+                    </a:lnBlToTr>
+                    <a:solidFill>
+                      <a:schemeClr val="tx2">
+                        <a:lumMod val="10000"/>
+                        <a:lumOff val="90000"/>
+                      </a:schemeClr>
+                    </a:solidFill>
+                  </a:tcPr>
+                </a:tc>
+                <a:tc>
+                  <a:txBody>
+                    <a:bodyPr/>
+                    <a:lstStyle/>
+                    <a:p>
+                      <a:endParaRPr lang="bg-BG" dirty="0"/>
+                    </a:p>
+                  </a:txBody>
+                  <a:tcPr>
+                    <a:lnL w="12700" cap="flat" cmpd="sng" algn="ctr">
+                      <a:noFill/>
+                      <a:prstDash val="solid"/>
+                      <a:round/>
+                      <a:headEnd type="none" w="med" len="med"/>
+                      <a:tailEnd type="none" w="med" len="med"/>
+                    </a:lnL>
+                    <a:lnR w="12700" cap="flat" cmpd="sng" algn="ctr">
+                      <a:noFill/>
+                      <a:prstDash val="solid"/>
+                      <a:round/>
+                      <a:headEnd type="none" w="med" len="med"/>
+                      <a:tailEnd type="none" w="med" len="med"/>
+                    </a:lnR>
+                    <a:lnT w="12700" cap="flat" cmpd="sng" algn="ctr">
+                      <a:noFill/>
+                      <a:prstDash val="solid"/>
+                      <a:round/>
+                      <a:headEnd type="none" w="med" len="med"/>
+                      <a:tailEnd type="none" w="med" len="med"/>
+                    </a:lnT>
+                    <a:lnB w="12700" cap="flat" cmpd="sng" algn="ctr">
+                      <a:noFill/>
+                      <a:prstDash val="solid"/>
+                      <a:round/>
+                      <a:headEnd type="none" w="med" len="med"/>
+                      <a:tailEnd type="none" w="med" len="med"/>
+                    </a:lnB>
+                    <a:lnTlToBr w="12700" cmpd="sng">
+                      <a:noFill/>
+                      <a:prstDash val="solid"/>
+                    </a:lnTlToBr>
+                    <a:lnBlToTr w="12700" cmpd="sng">
+                      <a:noFill/>
+                      <a:prstDash val="solid"/>
+                    </a:lnBlToTr>
+                    <a:solidFill>
+                      <a:schemeClr val="bg1"/>
+                    </a:solidFill>
+                  </a:tcPr>
+                </a:tc>
+                <a:extLst>
+                  <a:ext uri="{0D108BD9-81ED-4DB2-BD59-A6C34878D82A}">
+                    <a16:rowId xmlns:a16="http://schemas.microsoft.com/office/drawing/2014/main" val="346281172"/>
+                  </a:ext>
+                </a:extLst>
+              </a:tr>
+              <a:tr h="370110">
+                <a:tc>
+                  <a:txBody>
+                    <a:bodyPr/>
+                    <a:lstStyle/>
+                    <a:p>
+                      <a:endParaRPr lang="bg-BG" dirty="0"/>
+                    </a:p>
+                  </a:txBody>
+                  <a:tcPr>
+                    <a:lnL w="12700" cap="flat" cmpd="sng" algn="ctr">
+                      <a:noFill/>
+                      <a:prstDash val="solid"/>
+                      <a:round/>
+                      <a:headEnd type="none" w="med" len="med"/>
+                      <a:tailEnd type="none" w="med" len="med"/>
+                    </a:lnL>
+                    <a:lnR w="12700" cap="flat" cmpd="sng" algn="ctr">
+                      <a:noFill/>
+                      <a:prstDash val="solid"/>
+                      <a:round/>
+                      <a:headEnd type="none" w="med" len="med"/>
+                      <a:tailEnd type="none" w="med" len="med"/>
+                    </a:lnR>
+                    <a:lnT w="12700" cap="flat" cmpd="sng" algn="ctr">
+                      <a:noFill/>
+                      <a:prstDash val="solid"/>
+                      <a:round/>
+                      <a:headEnd type="none" w="med" len="med"/>
+                      <a:tailEnd type="none" w="med" len="med"/>
+                    </a:lnT>
+                    <a:lnB w="12700" cap="flat" cmpd="sng" algn="ctr">
+                      <a:noFill/>
+                      <a:prstDash val="solid"/>
+                      <a:round/>
+                      <a:headEnd type="none" w="med" len="med"/>
+                      <a:tailEnd type="none" w="med" len="med"/>
+                    </a:lnB>
+                    <a:lnTlToBr w="12700" cmpd="sng">
+                      <a:noFill/>
+                      <a:prstDash val="solid"/>
+                    </a:lnTlToBr>
+                    <a:lnBlToTr w="12700" cmpd="sng">
+                      <a:noFill/>
+                      <a:prstDash val="solid"/>
+                    </a:lnBlToTr>
+                    <a:solidFill>
+                      <a:schemeClr val="tx2">
+                        <a:lumMod val="10000"/>
+                        <a:lumOff val="90000"/>
+                      </a:schemeClr>
+                    </a:solidFill>
+                  </a:tcPr>
+                </a:tc>
+                <a:tc>
+                  <a:txBody>
+                    <a:bodyPr/>
+                    <a:lstStyle/>
+                    <a:p>
+                      <a:endParaRPr lang="bg-BG" dirty="0"/>
+                    </a:p>
+                  </a:txBody>
+                  <a:tcPr>
+                    <a:lnL w="12700" cap="flat" cmpd="sng" algn="ctr">
+                      <a:noFill/>
+                      <a:prstDash val="solid"/>
+                      <a:round/>
+                      <a:headEnd type="none" w="med" len="med"/>
+                      <a:tailEnd type="none" w="med" len="med"/>
+                    </a:lnL>
+                    <a:lnR w="12700" cap="flat" cmpd="sng" algn="ctr">
+                      <a:noFill/>
+                      <a:prstDash val="solid"/>
+                      <a:round/>
+                      <a:headEnd type="none" w="med" len="med"/>
+                      <a:tailEnd type="none" w="med" len="med"/>
+                    </a:lnR>
+                    <a:lnT w="12700" cap="flat" cmpd="sng" algn="ctr">
+                      <a:noFill/>
+                      <a:prstDash val="solid"/>
+                      <a:round/>
+                      <a:headEnd type="none" w="med" len="med"/>
+                      <a:tailEnd type="none" w="med" len="med"/>
+                    </a:lnT>
+                    <a:lnB w="12700" cap="flat" cmpd="sng" algn="ctr">
+                      <a:noFill/>
+                      <a:prstDash val="solid"/>
+                      <a:round/>
+                      <a:headEnd type="none" w="med" len="med"/>
+                      <a:tailEnd type="none" w="med" len="med"/>
+                    </a:lnB>
+                    <a:lnTlToBr w="12700" cmpd="sng">
+                      <a:noFill/>
+                      <a:prstDash val="solid"/>
+                    </a:lnTlToBr>
+                    <a:lnBlToTr w="12700" cmpd="sng">
+                      <a:noFill/>
+                      <a:prstDash val="solid"/>
+                    </a:lnBlToTr>
+                    <a:solidFill>
+                      <a:schemeClr val="bg1"/>
+                    </a:solidFill>
+                  </a:tcPr>
+                </a:tc>
+                <a:extLst>
+                  <a:ext uri="{0D108BD9-81ED-4DB2-BD59-A6C34878D82A}">
+                    <a16:rowId xmlns:a16="http://schemas.microsoft.com/office/drawing/2014/main" val="1025492225"/>
+                  </a:ext>
+                </a:extLst>
+              </a:tr>
+              <a:tr h="370110">
+                <a:tc>
+                  <a:txBody>
+                    <a:bodyPr/>
+                    <a:lstStyle/>
+                    <a:p>
+                      <a:endParaRPr lang="bg-BG" dirty="0"/>
+                    </a:p>
+                  </a:txBody>
+                  <a:tcPr>
+                    <a:lnL w="12700" cap="flat" cmpd="sng" algn="ctr">
+                      <a:noFill/>
+                      <a:prstDash val="solid"/>
+                      <a:round/>
+                      <a:headEnd type="none" w="med" len="med"/>
+                      <a:tailEnd type="none" w="med" len="med"/>
+                    </a:lnL>
+                    <a:lnR w="12700" cap="flat" cmpd="sng" algn="ctr">
+                      <a:noFill/>
+                      <a:prstDash val="solid"/>
+                      <a:round/>
+                      <a:headEnd type="none" w="med" len="med"/>
+                      <a:tailEnd type="none" w="med" len="med"/>
+                    </a:lnR>
+                    <a:lnT w="12700" cap="flat" cmpd="sng" algn="ctr">
+                      <a:noFill/>
+                      <a:prstDash val="solid"/>
+                      <a:round/>
+                      <a:headEnd type="none" w="med" len="med"/>
+                      <a:tailEnd type="none" w="med" len="med"/>
+                    </a:lnT>
+                    <a:lnB w="12700" cap="flat" cmpd="sng" algn="ctr">
+                      <a:noFill/>
+                      <a:prstDash val="solid"/>
+                      <a:round/>
+                      <a:headEnd type="none" w="med" len="med"/>
+                      <a:tailEnd type="none" w="med" len="med"/>
+                    </a:lnB>
+                    <a:lnTlToBr w="12700" cmpd="sng">
+                      <a:noFill/>
+                      <a:prstDash val="solid"/>
+                    </a:lnTlToBr>
+                    <a:lnBlToTr w="12700" cmpd="sng">
+                      <a:noFill/>
+                      <a:prstDash val="solid"/>
+                    </a:lnBlToTr>
+                    <a:solidFill>
+                      <a:schemeClr val="tx2">
+                        <a:lumMod val="10000"/>
+                        <a:lumOff val="90000"/>
+                      </a:schemeClr>
+                    </a:solidFill>
+                  </a:tcPr>
+                </a:tc>
+                <a:tc>
+                  <a:txBody>
+                    <a:bodyPr/>
+                    <a:lstStyle/>
+                    <a:p>
+                      <a:endParaRPr lang="bg-BG" dirty="0"/>
+                    </a:p>
+                  </a:txBody>
+                  <a:tcPr>
+                    <a:lnL w="12700" cap="flat" cmpd="sng" algn="ctr">
+                      <a:noFill/>
+                      <a:prstDash val="solid"/>
+                      <a:round/>
+                      <a:headEnd type="none" w="med" len="med"/>
+                      <a:tailEnd type="none" w="med" len="med"/>
+                    </a:lnL>
+                    <a:lnR w="12700" cap="flat" cmpd="sng" algn="ctr">
+                      <a:noFill/>
+                      <a:prstDash val="solid"/>
+                      <a:round/>
+                      <a:headEnd type="none" w="med" len="med"/>
+                      <a:tailEnd type="none" w="med" len="med"/>
+                    </a:lnR>
+                    <a:lnT w="12700" cap="flat" cmpd="sng" algn="ctr">
+                      <a:noFill/>
+                      <a:prstDash val="solid"/>
+                      <a:round/>
+                      <a:headEnd type="none" w="med" len="med"/>
+                      <a:tailEnd type="none" w="med" len="med"/>
+                    </a:lnT>
+                    <a:lnB w="12700" cap="flat" cmpd="sng" algn="ctr">
+                      <a:noFill/>
+                      <a:prstDash val="solid"/>
+                      <a:round/>
+                      <a:headEnd type="none" w="med" len="med"/>
+                      <a:tailEnd type="none" w="med" len="med"/>
+                    </a:lnB>
+                    <a:lnTlToBr w="12700" cmpd="sng">
+                      <a:noFill/>
+                      <a:prstDash val="solid"/>
+                    </a:lnTlToBr>
+                    <a:lnBlToTr w="12700" cmpd="sng">
+                      <a:noFill/>
+                      <a:prstDash val="solid"/>
+                    </a:lnBlToTr>
+                    <a:solidFill>
+                      <a:schemeClr val="bg1"/>
+                    </a:solidFill>
+                  </a:tcPr>
+                </a:tc>
+                <a:extLst>
+                  <a:ext uri="{0D108BD9-81ED-4DB2-BD59-A6C34878D82A}">
+                    <a16:rowId xmlns:a16="http://schemas.microsoft.com/office/drawing/2014/main" val="1203000147"/>
+                  </a:ext>
+                </a:extLst>
+              </a:tr>
+              <a:tr h="370110">
+                <a:tc>
+                  <a:txBody>
+                    <a:bodyPr/>
+                    <a:lstStyle/>
+                    <a:p>
+                      <a:endParaRPr lang="bg-BG" dirty="0"/>
+                    </a:p>
+                  </a:txBody>
+                  <a:tcPr>
+                    <a:lnL w="12700" cap="flat" cmpd="sng" algn="ctr">
+                      <a:noFill/>
+                      <a:prstDash val="solid"/>
+                      <a:round/>
+                      <a:headEnd type="none" w="med" len="med"/>
+                      <a:tailEnd type="none" w="med" len="med"/>
+                    </a:lnL>
+                    <a:lnR w="12700" cap="flat" cmpd="sng" algn="ctr">
+                      <a:noFill/>
+                      <a:prstDash val="solid"/>
+                      <a:round/>
+                      <a:headEnd type="none" w="med" len="med"/>
+                      <a:tailEnd type="none" w="med" len="med"/>
+                    </a:lnR>
+                    <a:lnT w="12700" cap="flat" cmpd="sng" algn="ctr">
+                      <a:noFill/>
+                      <a:prstDash val="solid"/>
+                      <a:round/>
+                      <a:headEnd type="none" w="med" len="med"/>
+                      <a:tailEnd type="none" w="med" len="med"/>
+                    </a:lnT>
+                    <a:lnB w="12700" cap="flat" cmpd="sng" algn="ctr">
+                      <a:noFill/>
+                      <a:prstDash val="solid"/>
+                      <a:round/>
+                      <a:headEnd type="none" w="med" len="med"/>
+                      <a:tailEnd type="none" w="med" len="med"/>
+                    </a:lnB>
+                    <a:lnTlToBr w="12700" cmpd="sng">
+                      <a:noFill/>
+                      <a:prstDash val="solid"/>
+                    </a:lnTlToBr>
+                    <a:lnBlToTr w="12700" cmpd="sng">
+                      <a:noFill/>
+                      <a:prstDash val="solid"/>
+                    </a:lnBlToTr>
+                    <a:solidFill>
+                      <a:schemeClr val="tx2">
+                        <a:lumMod val="10000"/>
+                        <a:lumOff val="90000"/>
+                      </a:schemeClr>
+                    </a:solidFill>
+                  </a:tcPr>
+                </a:tc>
+                <a:tc>
+                  <a:txBody>
+                    <a:bodyPr/>
+                    <a:lstStyle/>
+                    <a:p>
+                      <a:endParaRPr lang="bg-BG" dirty="0"/>
+                    </a:p>
+                  </a:txBody>
+                  <a:tcPr>
+                    <a:lnL w="12700" cap="flat" cmpd="sng" algn="ctr">
+                      <a:noFill/>
+                      <a:prstDash val="solid"/>
+                      <a:round/>
+                      <a:headEnd type="none" w="med" len="med"/>
+                      <a:tailEnd type="none" w="med" len="med"/>
+                    </a:lnL>
+                    <a:lnR w="12700" cap="flat" cmpd="sng" algn="ctr">
+                      <a:noFill/>
+                      <a:prstDash val="solid"/>
+                      <a:round/>
+                      <a:headEnd type="none" w="med" len="med"/>
+                      <a:tailEnd type="none" w="med" len="med"/>
+                    </a:lnR>
+                    <a:lnT w="12700" cap="flat" cmpd="sng" algn="ctr">
+                      <a:noFill/>
+                      <a:prstDash val="solid"/>
+                      <a:round/>
+                      <a:headEnd type="none" w="med" len="med"/>
+                      <a:tailEnd type="none" w="med" len="med"/>
+                    </a:lnT>
+                    <a:lnB w="12700" cap="flat" cmpd="sng" algn="ctr">
+                      <a:noFill/>
+                      <a:prstDash val="solid"/>
+                      <a:round/>
+                      <a:headEnd type="none" w="med" len="med"/>
+                      <a:tailEnd type="none" w="med" len="med"/>
+                    </a:lnB>
+                    <a:lnTlToBr w="12700" cmpd="sng">
+                      <a:noFill/>
+                      <a:prstDash val="solid"/>
+                    </a:lnTlToBr>
+                    <a:lnBlToTr w="12700" cmpd="sng">
+                      <a:noFill/>
+                      <a:prstDash val="solid"/>
+                    </a:lnBlToTr>
+                    <a:solidFill>
+                      <a:schemeClr val="bg1"/>
+                    </a:solidFill>
+                  </a:tcPr>
+                </a:tc>
+                <a:extLst>
+                  <a:ext uri="{0D108BD9-81ED-4DB2-BD59-A6C34878D82A}">
+                    <a16:rowId xmlns:a16="http://schemas.microsoft.com/office/drawing/2014/main" val="400327065"/>
+                  </a:ext>
+                </a:extLst>
+              </a:tr>
+              <a:tr h="370110">
+                <a:tc>
+                  <a:txBody>
+                    <a:bodyPr/>
+                    <a:lstStyle/>
+                    <a:p>
+                      <a:endParaRPr lang="bg-BG" dirty="0"/>
+                    </a:p>
+                  </a:txBody>
+                  <a:tcPr>
+                    <a:lnL w="12700" cap="flat" cmpd="sng" algn="ctr">
+                      <a:noFill/>
+                      <a:prstDash val="solid"/>
+                      <a:round/>
+                      <a:headEnd type="none" w="med" len="med"/>
+                      <a:tailEnd type="none" w="med" len="med"/>
+                    </a:lnL>
+                    <a:lnR w="12700" cap="flat" cmpd="sng" algn="ctr">
+                      <a:noFill/>
+                      <a:prstDash val="solid"/>
+                      <a:round/>
+                      <a:headEnd type="none" w="med" len="med"/>
+                      <a:tailEnd type="none" w="med" len="med"/>
+                    </a:lnR>
+                    <a:lnT w="12700" cap="flat" cmpd="sng" algn="ctr">
+                      <a:noFill/>
+                      <a:prstDash val="solid"/>
+                      <a:round/>
+                      <a:headEnd type="none" w="med" len="med"/>
+                      <a:tailEnd type="none" w="med" len="med"/>
+                    </a:lnT>
+                    <a:lnB w="12700" cap="flat" cmpd="sng" algn="ctr">
+                      <a:noFill/>
+                      <a:prstDash val="solid"/>
+                      <a:round/>
+                      <a:headEnd type="none" w="med" len="med"/>
+                      <a:tailEnd type="none" w="med" len="med"/>
+                    </a:lnB>
+                    <a:lnTlToBr w="12700" cmpd="sng">
+                      <a:noFill/>
+                      <a:prstDash val="solid"/>
+                    </a:lnTlToBr>
+                    <a:lnBlToTr w="12700" cmpd="sng">
+                      <a:noFill/>
+                      <a:prstDash val="solid"/>
+                    </a:lnBlToTr>
+                    <a:solidFill>
+                      <a:schemeClr val="tx2">
+                        <a:lumMod val="10000"/>
+                        <a:lumOff val="90000"/>
+                      </a:schemeClr>
+                    </a:solidFill>
+                  </a:tcPr>
+                </a:tc>
+                <a:tc>
+                  <a:txBody>
+                    <a:bodyPr/>
+                    <a:lstStyle/>
+                    <a:p>
+                      <a:endParaRPr lang="bg-BG" dirty="0"/>
+                    </a:p>
+                  </a:txBody>
+                  <a:tcPr>
+                    <a:lnL w="12700" cap="flat" cmpd="sng" algn="ctr">
+                      <a:noFill/>
+                      <a:prstDash val="solid"/>
+                      <a:round/>
+                      <a:headEnd type="none" w="med" len="med"/>
+                      <a:tailEnd type="none" w="med" len="med"/>
+                    </a:lnL>
+                    <a:lnR w="12700" cap="flat" cmpd="sng" algn="ctr">
+                      <a:noFill/>
+                      <a:prstDash val="solid"/>
+                      <a:round/>
+                      <a:headEnd type="none" w="med" len="med"/>
+                      <a:tailEnd type="none" w="med" len="med"/>
+                    </a:lnR>
+                    <a:lnT w="12700" cap="flat" cmpd="sng" algn="ctr">
+                      <a:noFill/>
+                      <a:prstDash val="solid"/>
+                      <a:round/>
+                      <a:headEnd type="none" w="med" len="med"/>
+                      <a:tailEnd type="none" w="med" len="med"/>
+                    </a:lnT>
+                    <a:lnB w="12700" cap="flat" cmpd="sng" algn="ctr">
+                      <a:noFill/>
+                      <a:prstDash val="solid"/>
+                      <a:round/>
+                      <a:headEnd type="none" w="med" len="med"/>
+                      <a:tailEnd type="none" w="med" len="med"/>
+                    </a:lnB>
+                    <a:lnTlToBr w="12700" cmpd="sng">
+                      <a:noFill/>
+                      <a:prstDash val="solid"/>
+                    </a:lnTlToBr>
+                    <a:lnBlToTr w="12700" cmpd="sng">
+                      <a:noFill/>
+                      <a:prstDash val="solid"/>
+                    </a:lnBlToTr>
+                    <a:solidFill>
+                      <a:schemeClr val="bg1"/>
+                    </a:solidFill>
+                  </a:tcPr>
+                </a:tc>
+                <a:extLst>
+                  <a:ext uri="{0D108BD9-81ED-4DB2-BD59-A6C34878D82A}">
+                    <a16:rowId xmlns:a16="http://schemas.microsoft.com/office/drawing/2014/main" val="297386272"/>
+                  </a:ext>
+                </a:extLst>
+              </a:tr>
+            </a:tbl>
+          </a:graphicData>
+        </a:graphic>
+      </p:graphicFrame>
+      <p:sp>
+        <p:nvSpPr>
+          <p:cNvPr id="26" name="Rectangle 25">
+            <a:extLst>
+              <a:ext uri="{FF2B5EF4-FFF2-40B4-BE49-F238E27FC236}">
+                <a16:creationId xmlns:a16="http://schemas.microsoft.com/office/drawing/2014/main" id="{AEB9E6CF-B937-5E98-2E9D-4E430CD36E04}"/>
+              </a:ext>
+            </a:extLst>
+          </p:cNvPr>
+          <p:cNvSpPr/>
+          <p:nvPr/>
+        </p:nvSpPr>
+        <p:spPr>
+          <a:xfrm>
+            <a:off x="1987550" y="2352751"/>
+            <a:ext cx="525514" cy="291525"/>
+          </a:xfrm>
+          <a:prstGeom prst="rect">
+            <a:avLst/>
+          </a:prstGeom>
+          <a:solidFill>
+            <a:schemeClr val="bg2">
+              <a:lumMod val="90000"/>
+            </a:schemeClr>
+          </a:solidFill>
+          <a:ln>
+            <a:noFill/>
+          </a:ln>
+        </p:spPr>
+        <p:style>
+          <a:lnRef idx="2">
+            <a:schemeClr val="accent1">
+              <a:shade val="15000"/>
+            </a:schemeClr>
+          </a:lnRef>
+          <a:fillRef idx="1">
+            <a:schemeClr val="accent1"/>
+          </a:fillRef>
+          <a:effectRef idx="0">
+            <a:schemeClr val="accent1"/>
+          </a:effectRef>
+          <a:fontRef idx="minor">
+            <a:schemeClr val="lt1"/>
+          </a:fontRef>
+        </p:style>
+        <p:txBody>
+          <a:bodyPr rtlCol="0" anchor="ctr"/>
+          <a:lstStyle/>
+          <a:p>
+            <a:pPr algn="r"/>
+            <a:r>
+              <a:rPr lang="en-US" sz="300" dirty="0"/>
+              <a:t>from –to</a:t>
+            </a:r>
+          </a:p>
+          <a:p>
+            <a:pPr algn="r"/>
+            <a:r>
+              <a:rPr lang="en-US" sz="300" dirty="0"/>
+              <a:t>Incoming date</a:t>
+            </a:r>
+          </a:p>
+          <a:p>
+            <a:pPr algn="r"/>
+            <a:r>
+              <a:rPr lang="en-US" sz="300" dirty="0"/>
+              <a:t>Delivery date</a:t>
+            </a:r>
+            <a:endParaRPr lang="bg-BG" sz="300" dirty="0"/>
+          </a:p>
+        </p:txBody>
+      </p:sp>
+      <p:pic>
+        <p:nvPicPr>
+          <p:cNvPr id="27" name="Picture 26">
+            <a:extLst>
+              <a:ext uri="{FF2B5EF4-FFF2-40B4-BE49-F238E27FC236}">
+                <a16:creationId xmlns:a16="http://schemas.microsoft.com/office/drawing/2014/main" id="{927CEC33-8149-B0A9-6044-933DE5FC0275}"/>
+              </a:ext>
+            </a:extLst>
+          </p:cNvPr>
+          <p:cNvPicPr>
+            <a:picLocks noChangeAspect="1"/>
+          </p:cNvPicPr>
+          <p:nvPr/>
+        </p:nvPicPr>
+        <p:blipFill>
+          <a:blip r:embed="rId2"/>
+          <a:stretch>
+            <a:fillRect/>
+          </a:stretch>
+        </p:blipFill>
+        <p:spPr>
+          <a:xfrm>
+            <a:off x="1987550" y="2398751"/>
+            <a:ext cx="206714" cy="199707"/>
+          </a:xfrm>
+          <a:prstGeom prst="rect">
+            <a:avLst/>
+          </a:prstGeom>
+        </p:spPr>
+      </p:pic>
+      <p:sp>
+        <p:nvSpPr>
+          <p:cNvPr id="28" name="Rectangle 27">
+            <a:extLst>
+              <a:ext uri="{FF2B5EF4-FFF2-40B4-BE49-F238E27FC236}">
+                <a16:creationId xmlns:a16="http://schemas.microsoft.com/office/drawing/2014/main" id="{99EB0517-47EA-E8CB-4E6E-773132F4421A}"/>
+              </a:ext>
+            </a:extLst>
+          </p:cNvPr>
+          <p:cNvSpPr/>
+          <p:nvPr/>
+        </p:nvSpPr>
+        <p:spPr>
+          <a:xfrm>
+            <a:off x="1987550" y="2687752"/>
+            <a:ext cx="525514" cy="291525"/>
+          </a:xfrm>
+          <a:prstGeom prst="rect">
+            <a:avLst/>
+          </a:prstGeom>
+          <a:solidFill>
+            <a:schemeClr val="bg2">
+              <a:lumMod val="90000"/>
+            </a:schemeClr>
+          </a:solidFill>
+          <a:ln>
+            <a:noFill/>
+          </a:ln>
+        </p:spPr>
+        <p:style>
+          <a:lnRef idx="2">
+            <a:schemeClr val="accent1">
+              <a:shade val="15000"/>
+            </a:schemeClr>
+          </a:lnRef>
+          <a:fillRef idx="1">
+            <a:schemeClr val="accent1"/>
+          </a:fillRef>
+          <a:effectRef idx="0">
+            <a:schemeClr val="accent1"/>
+          </a:effectRef>
+          <a:fontRef idx="minor">
+            <a:schemeClr val="lt1"/>
+          </a:fontRef>
+        </p:style>
+        <p:txBody>
+          <a:bodyPr rtlCol="0" anchor="ctr"/>
+          <a:lstStyle/>
+          <a:p>
+            <a:pPr algn="r"/>
+            <a:r>
+              <a:rPr lang="en-US" sz="300" dirty="0"/>
+              <a:t>from –to</a:t>
+            </a:r>
+          </a:p>
+          <a:p>
+            <a:pPr algn="r"/>
+            <a:r>
+              <a:rPr lang="en-US" sz="300" dirty="0"/>
+              <a:t>Incoming date</a:t>
+            </a:r>
+          </a:p>
+          <a:p>
+            <a:pPr algn="r"/>
+            <a:r>
+              <a:rPr lang="en-US" sz="300" dirty="0"/>
+              <a:t>Delivery date</a:t>
+            </a:r>
+            <a:endParaRPr lang="bg-BG" sz="300" dirty="0"/>
+          </a:p>
+        </p:txBody>
+      </p:sp>
+      <p:pic>
+        <p:nvPicPr>
+          <p:cNvPr id="29" name="Picture 28">
+            <a:extLst>
+              <a:ext uri="{FF2B5EF4-FFF2-40B4-BE49-F238E27FC236}">
+                <a16:creationId xmlns:a16="http://schemas.microsoft.com/office/drawing/2014/main" id="{6A17A770-F78F-6EB5-A667-BAC8CF00CC05}"/>
+              </a:ext>
+            </a:extLst>
+          </p:cNvPr>
+          <p:cNvPicPr>
+            <a:picLocks noChangeAspect="1"/>
+          </p:cNvPicPr>
+          <p:nvPr/>
+        </p:nvPicPr>
+        <p:blipFill>
+          <a:blip r:embed="rId2"/>
+          <a:stretch>
+            <a:fillRect/>
+          </a:stretch>
+        </p:blipFill>
+        <p:spPr>
+          <a:xfrm>
+            <a:off x="1987550" y="2733752"/>
+            <a:ext cx="206714" cy="199707"/>
+          </a:xfrm>
+          <a:prstGeom prst="rect">
+            <a:avLst/>
+          </a:prstGeom>
+        </p:spPr>
+      </p:pic>
+      <p:sp>
+        <p:nvSpPr>
+          <p:cNvPr id="31" name="Rectangle 30">
+            <a:extLst>
+              <a:ext uri="{FF2B5EF4-FFF2-40B4-BE49-F238E27FC236}">
+                <a16:creationId xmlns:a16="http://schemas.microsoft.com/office/drawing/2014/main" id="{F2D0B14A-DDE6-0A42-DFDC-4398DE74D75E}"/>
+              </a:ext>
+            </a:extLst>
+          </p:cNvPr>
+          <p:cNvSpPr/>
+          <p:nvPr/>
+        </p:nvSpPr>
+        <p:spPr>
+          <a:xfrm>
+            <a:off x="2599888" y="1131151"/>
+            <a:ext cx="525514" cy="291525"/>
+          </a:xfrm>
+          <a:prstGeom prst="rect">
+            <a:avLst/>
+          </a:prstGeom>
+          <a:solidFill>
+            <a:schemeClr val="bg2">
+              <a:lumMod val="90000"/>
+            </a:schemeClr>
+          </a:solidFill>
+          <a:ln>
+            <a:noFill/>
+          </a:ln>
+        </p:spPr>
+        <p:style>
+          <a:lnRef idx="2">
+            <a:schemeClr val="accent1">
+              <a:shade val="15000"/>
+            </a:schemeClr>
+          </a:lnRef>
+          <a:fillRef idx="1">
+            <a:schemeClr val="accent1"/>
+          </a:fillRef>
+          <a:effectRef idx="0">
+            <a:schemeClr val="accent1"/>
+          </a:effectRef>
+          <a:fontRef idx="minor">
+            <a:schemeClr val="lt1"/>
+          </a:fontRef>
+        </p:style>
+        <p:txBody>
+          <a:bodyPr rtlCol="0" anchor="ctr"/>
+          <a:lstStyle/>
+          <a:p>
+            <a:pPr algn="r"/>
+            <a:r>
+              <a:rPr lang="en-US" sz="200" dirty="0"/>
+              <a:t>from –to</a:t>
+            </a:r>
+          </a:p>
+          <a:p>
+            <a:pPr algn="r"/>
+            <a:r>
+              <a:rPr lang="en-US" sz="200" dirty="0"/>
+              <a:t>Incoming date</a:t>
+            </a:r>
+          </a:p>
+          <a:p>
+            <a:pPr algn="r"/>
+            <a:r>
+              <a:rPr lang="en-US" sz="200" dirty="0"/>
+              <a:t>Delivery date</a:t>
+            </a:r>
+            <a:endParaRPr lang="bg-BG" sz="200" dirty="0"/>
+          </a:p>
+        </p:txBody>
+      </p:sp>
+      <p:sp>
+        <p:nvSpPr>
+          <p:cNvPr id="32" name="Rectangle 31">
+            <a:extLst>
+              <a:ext uri="{FF2B5EF4-FFF2-40B4-BE49-F238E27FC236}">
+                <a16:creationId xmlns:a16="http://schemas.microsoft.com/office/drawing/2014/main" id="{C173A90E-9380-2E24-9A1C-389B89A294D1}"/>
+              </a:ext>
+            </a:extLst>
+          </p:cNvPr>
+          <p:cNvSpPr/>
+          <p:nvPr/>
+        </p:nvSpPr>
+        <p:spPr>
+          <a:xfrm>
+            <a:off x="2599888" y="1512151"/>
+            <a:ext cx="525514" cy="291525"/>
+          </a:xfrm>
+          <a:prstGeom prst="rect">
+            <a:avLst/>
+          </a:prstGeom>
+          <a:solidFill>
+            <a:schemeClr val="bg2">
+              <a:lumMod val="90000"/>
+            </a:schemeClr>
+          </a:solidFill>
+          <a:ln>
+            <a:noFill/>
+          </a:ln>
+        </p:spPr>
+        <p:style>
+          <a:lnRef idx="2">
+            <a:schemeClr val="accent1">
+              <a:shade val="15000"/>
+            </a:schemeClr>
+          </a:lnRef>
+          <a:fillRef idx="1">
+            <a:schemeClr val="accent1"/>
+          </a:fillRef>
+          <a:effectRef idx="0">
+            <a:schemeClr val="accent1"/>
+          </a:effectRef>
+          <a:fontRef idx="minor">
+            <a:schemeClr val="lt1"/>
+          </a:fontRef>
+        </p:style>
+        <p:txBody>
+          <a:bodyPr rtlCol="0" anchor="ctr"/>
+          <a:lstStyle/>
+          <a:p>
+            <a:pPr algn="r"/>
+            <a:r>
+              <a:rPr lang="en-US" sz="200" dirty="0"/>
+              <a:t>from –to</a:t>
+            </a:r>
+          </a:p>
+          <a:p>
+            <a:pPr algn="r"/>
+            <a:r>
+              <a:rPr lang="en-US" sz="200" dirty="0"/>
+              <a:t>Incoming date</a:t>
+            </a:r>
+          </a:p>
+          <a:p>
+            <a:pPr algn="r"/>
+            <a:r>
+              <a:rPr lang="en-US" sz="200" dirty="0"/>
+              <a:t>Delivery date</a:t>
+            </a:r>
+            <a:endParaRPr lang="bg-BG" sz="200" dirty="0"/>
+          </a:p>
+        </p:txBody>
+      </p:sp>
+      <p:pic>
+        <p:nvPicPr>
+          <p:cNvPr id="33" name="Picture 32">
+            <a:extLst>
+              <a:ext uri="{FF2B5EF4-FFF2-40B4-BE49-F238E27FC236}">
+                <a16:creationId xmlns:a16="http://schemas.microsoft.com/office/drawing/2014/main" id="{13475500-3176-59BE-75EC-44C706A00EEC}"/>
+              </a:ext>
+            </a:extLst>
+          </p:cNvPr>
+          <p:cNvPicPr>
+            <a:picLocks noChangeAspect="1"/>
+          </p:cNvPicPr>
+          <p:nvPr/>
+        </p:nvPicPr>
+        <p:blipFill>
+          <a:blip r:embed="rId2"/>
+          <a:stretch>
+            <a:fillRect/>
+          </a:stretch>
+        </p:blipFill>
+        <p:spPr>
+          <a:xfrm>
+            <a:off x="2599888" y="1558151"/>
+            <a:ext cx="206714" cy="199707"/>
+          </a:xfrm>
+          <a:prstGeom prst="rect">
+            <a:avLst/>
+          </a:prstGeom>
+        </p:spPr>
+      </p:pic>
+      <p:sp>
+        <p:nvSpPr>
+          <p:cNvPr id="34" name="Rectangle 33">
+            <a:extLst>
+              <a:ext uri="{FF2B5EF4-FFF2-40B4-BE49-F238E27FC236}">
+                <a16:creationId xmlns:a16="http://schemas.microsoft.com/office/drawing/2014/main" id="{4279551F-F664-646F-4996-B7A76FD746A8}"/>
+              </a:ext>
+            </a:extLst>
+          </p:cNvPr>
+          <p:cNvSpPr/>
+          <p:nvPr/>
+        </p:nvSpPr>
+        <p:spPr>
+          <a:xfrm>
+            <a:off x="2599888" y="1847152"/>
+            <a:ext cx="525514" cy="291525"/>
+          </a:xfrm>
+          <a:prstGeom prst="rect">
+            <a:avLst/>
+          </a:prstGeom>
+          <a:solidFill>
+            <a:schemeClr val="bg2">
+              <a:lumMod val="90000"/>
+            </a:schemeClr>
+          </a:solidFill>
+          <a:ln>
+            <a:noFill/>
+          </a:ln>
+        </p:spPr>
+        <p:style>
+          <a:lnRef idx="2">
+            <a:schemeClr val="accent1">
+              <a:shade val="15000"/>
+            </a:schemeClr>
+          </a:lnRef>
+          <a:fillRef idx="1">
+            <a:schemeClr val="accent1"/>
+          </a:fillRef>
+          <a:effectRef idx="0">
+            <a:schemeClr val="accent1"/>
+          </a:effectRef>
+          <a:fontRef idx="minor">
+            <a:schemeClr val="lt1"/>
+          </a:fontRef>
+        </p:style>
+        <p:txBody>
+          <a:bodyPr rtlCol="0" anchor="ctr"/>
+          <a:lstStyle/>
+          <a:p>
+            <a:pPr algn="r"/>
+            <a:r>
+              <a:rPr lang="en-US" sz="300" dirty="0"/>
+              <a:t>from –to</a:t>
+            </a:r>
+          </a:p>
+          <a:p>
+            <a:pPr algn="r"/>
+            <a:r>
+              <a:rPr lang="en-US" sz="300" dirty="0"/>
+              <a:t>Incoming date</a:t>
+            </a:r>
+          </a:p>
+          <a:p>
+            <a:pPr algn="r"/>
+            <a:r>
+              <a:rPr lang="en-US" sz="300" dirty="0"/>
+              <a:t>Delivery date</a:t>
+            </a:r>
+            <a:endParaRPr lang="bg-BG" sz="300" dirty="0"/>
+          </a:p>
+        </p:txBody>
+      </p:sp>
+      <p:pic>
+        <p:nvPicPr>
+          <p:cNvPr id="35" name="Picture 34">
+            <a:extLst>
+              <a:ext uri="{FF2B5EF4-FFF2-40B4-BE49-F238E27FC236}">
+                <a16:creationId xmlns:a16="http://schemas.microsoft.com/office/drawing/2014/main" id="{6196935E-9907-B51C-0201-17C8ECF66E3C}"/>
+              </a:ext>
+            </a:extLst>
+          </p:cNvPr>
+          <p:cNvPicPr>
+            <a:picLocks noChangeAspect="1"/>
+          </p:cNvPicPr>
+          <p:nvPr/>
+        </p:nvPicPr>
+        <p:blipFill>
+          <a:blip r:embed="rId2"/>
+          <a:stretch>
+            <a:fillRect/>
+          </a:stretch>
+        </p:blipFill>
+        <p:spPr>
+          <a:xfrm>
+            <a:off x="2599888" y="1893152"/>
+            <a:ext cx="206714" cy="199707"/>
+          </a:xfrm>
+          <a:prstGeom prst="rect">
+            <a:avLst/>
+          </a:prstGeom>
+        </p:spPr>
+      </p:pic>
+      <p:pic>
+        <p:nvPicPr>
+          <p:cNvPr id="36" name="Picture 35">
+            <a:extLst>
+              <a:ext uri="{FF2B5EF4-FFF2-40B4-BE49-F238E27FC236}">
+                <a16:creationId xmlns:a16="http://schemas.microsoft.com/office/drawing/2014/main" id="{7BC1A03E-E711-F6C9-66AE-10E79F5FC51F}"/>
+              </a:ext>
+            </a:extLst>
+          </p:cNvPr>
+          <p:cNvPicPr>
+            <a:picLocks noChangeAspect="1"/>
+          </p:cNvPicPr>
+          <p:nvPr/>
+        </p:nvPicPr>
+        <p:blipFill>
+          <a:blip r:embed="rId2"/>
+          <a:stretch>
+            <a:fillRect/>
+          </a:stretch>
+        </p:blipFill>
+        <p:spPr>
+          <a:xfrm>
+            <a:off x="2599888" y="1189000"/>
+            <a:ext cx="206714" cy="199707"/>
+          </a:xfrm>
+          <a:prstGeom prst="rect">
+            <a:avLst/>
+          </a:prstGeom>
+        </p:spPr>
+      </p:pic>
+      <p:sp>
+        <p:nvSpPr>
+          <p:cNvPr id="67" name="Rectangle 66">
+            <a:extLst>
+              <a:ext uri="{FF2B5EF4-FFF2-40B4-BE49-F238E27FC236}">
+                <a16:creationId xmlns:a16="http://schemas.microsoft.com/office/drawing/2014/main" id="{932ABA79-1EE8-8FB5-BF9D-F17CDE4ADCB5}"/>
+              </a:ext>
+            </a:extLst>
+          </p:cNvPr>
+          <p:cNvSpPr/>
+          <p:nvPr/>
+        </p:nvSpPr>
+        <p:spPr>
+          <a:xfrm>
+            <a:off x="1993900" y="1131151"/>
+            <a:ext cx="525514" cy="291525"/>
+          </a:xfrm>
+          <a:prstGeom prst="rect">
+            <a:avLst/>
+          </a:prstGeom>
+          <a:solidFill>
+            <a:schemeClr val="bg2">
+              <a:lumMod val="90000"/>
+            </a:schemeClr>
+          </a:solidFill>
+          <a:ln>
+            <a:noFill/>
+          </a:ln>
+        </p:spPr>
+        <p:style>
+          <a:lnRef idx="2">
+            <a:schemeClr val="accent1">
+              <a:shade val="15000"/>
+            </a:schemeClr>
+          </a:lnRef>
+          <a:fillRef idx="1">
+            <a:schemeClr val="accent1"/>
+          </a:fillRef>
+          <a:effectRef idx="0">
+            <a:schemeClr val="accent1"/>
+          </a:effectRef>
+          <a:fontRef idx="minor">
+            <a:schemeClr val="lt1"/>
+          </a:fontRef>
+        </p:style>
+        <p:txBody>
+          <a:bodyPr rtlCol="0" anchor="ctr"/>
+          <a:lstStyle/>
+          <a:p>
+            <a:pPr algn="r"/>
+            <a:r>
+              <a:rPr lang="en-US" sz="300" dirty="0"/>
+              <a:t>from –to</a:t>
+            </a:r>
+          </a:p>
+          <a:p>
+            <a:pPr algn="r"/>
+            <a:r>
+              <a:rPr lang="en-US" sz="300" dirty="0"/>
+              <a:t>Incoming date</a:t>
+            </a:r>
+          </a:p>
+          <a:p>
+            <a:pPr algn="r"/>
+            <a:r>
+              <a:rPr lang="en-US" sz="300" dirty="0"/>
+              <a:t>Delivery date</a:t>
+            </a:r>
+            <a:endParaRPr lang="bg-BG" sz="300" dirty="0"/>
+          </a:p>
+        </p:txBody>
+      </p:sp>
+      <p:sp>
+        <p:nvSpPr>
+          <p:cNvPr id="68" name="Rectangle 67">
+            <a:extLst>
+              <a:ext uri="{FF2B5EF4-FFF2-40B4-BE49-F238E27FC236}">
+                <a16:creationId xmlns:a16="http://schemas.microsoft.com/office/drawing/2014/main" id="{F8BF4335-2A9F-116C-4322-34D0E7841725}"/>
+              </a:ext>
+            </a:extLst>
+          </p:cNvPr>
+          <p:cNvSpPr/>
+          <p:nvPr/>
+        </p:nvSpPr>
+        <p:spPr>
+          <a:xfrm>
+            <a:off x="1993900" y="1512151"/>
+            <a:ext cx="525514" cy="291525"/>
+          </a:xfrm>
+          <a:prstGeom prst="rect">
+            <a:avLst/>
+          </a:prstGeom>
+          <a:solidFill>
+            <a:schemeClr val="bg2">
+              <a:lumMod val="90000"/>
+            </a:schemeClr>
+          </a:solidFill>
+          <a:ln>
+            <a:noFill/>
+          </a:ln>
+        </p:spPr>
+        <p:style>
+          <a:lnRef idx="2">
+            <a:schemeClr val="accent1">
+              <a:shade val="15000"/>
+            </a:schemeClr>
+          </a:lnRef>
+          <a:fillRef idx="1">
+            <a:schemeClr val="accent1"/>
+          </a:fillRef>
+          <a:effectRef idx="0">
+            <a:schemeClr val="accent1"/>
+          </a:effectRef>
+          <a:fontRef idx="minor">
+            <a:schemeClr val="lt1"/>
+          </a:fontRef>
+        </p:style>
+        <p:txBody>
+          <a:bodyPr rtlCol="0" anchor="ctr"/>
+          <a:lstStyle/>
+          <a:p>
+            <a:pPr algn="r"/>
+            <a:r>
+              <a:rPr lang="en-US" sz="300" dirty="0"/>
+              <a:t>from –to</a:t>
+            </a:r>
+          </a:p>
+          <a:p>
+            <a:pPr algn="r"/>
+            <a:r>
+              <a:rPr lang="en-US" sz="300" dirty="0"/>
+              <a:t>Incoming date</a:t>
+            </a:r>
+          </a:p>
+          <a:p>
+            <a:pPr algn="r"/>
+            <a:r>
+              <a:rPr lang="en-US" sz="300" dirty="0"/>
+              <a:t>Delivery date</a:t>
+            </a:r>
+            <a:endParaRPr lang="bg-BG" sz="300" dirty="0"/>
+          </a:p>
+        </p:txBody>
+      </p:sp>
+      <p:pic>
+        <p:nvPicPr>
+          <p:cNvPr id="69" name="Picture 68">
+            <a:extLst>
+              <a:ext uri="{FF2B5EF4-FFF2-40B4-BE49-F238E27FC236}">
+                <a16:creationId xmlns:a16="http://schemas.microsoft.com/office/drawing/2014/main" id="{E6D5374F-82F1-A63E-C601-63B6A7AC97CC}"/>
+              </a:ext>
+            </a:extLst>
+          </p:cNvPr>
+          <p:cNvPicPr>
+            <a:picLocks noChangeAspect="1"/>
+          </p:cNvPicPr>
+          <p:nvPr/>
+        </p:nvPicPr>
+        <p:blipFill>
+          <a:blip r:embed="rId2"/>
+          <a:stretch>
+            <a:fillRect/>
+          </a:stretch>
+        </p:blipFill>
+        <p:spPr>
+          <a:xfrm>
+            <a:off x="1993900" y="1558151"/>
+            <a:ext cx="206714" cy="199707"/>
+          </a:xfrm>
+          <a:prstGeom prst="rect">
+            <a:avLst/>
+          </a:prstGeom>
+        </p:spPr>
+      </p:pic>
+      <p:sp>
+        <p:nvSpPr>
+          <p:cNvPr id="70" name="Rectangle 69">
+            <a:extLst>
+              <a:ext uri="{FF2B5EF4-FFF2-40B4-BE49-F238E27FC236}">
+                <a16:creationId xmlns:a16="http://schemas.microsoft.com/office/drawing/2014/main" id="{2288448A-616E-AC75-E454-5F3A1908B2DF}"/>
+              </a:ext>
+            </a:extLst>
+          </p:cNvPr>
+          <p:cNvSpPr/>
+          <p:nvPr/>
+        </p:nvSpPr>
+        <p:spPr>
+          <a:xfrm>
+            <a:off x="1993900" y="1847152"/>
+            <a:ext cx="525514" cy="291525"/>
+          </a:xfrm>
+          <a:prstGeom prst="rect">
+            <a:avLst/>
+          </a:prstGeom>
+          <a:solidFill>
+            <a:schemeClr val="bg2">
+              <a:lumMod val="90000"/>
+            </a:schemeClr>
+          </a:solidFill>
+          <a:ln>
+            <a:noFill/>
+          </a:ln>
+        </p:spPr>
+        <p:style>
+          <a:lnRef idx="2">
+            <a:schemeClr val="accent1">
+              <a:shade val="15000"/>
+            </a:schemeClr>
+          </a:lnRef>
+          <a:fillRef idx="1">
+            <a:schemeClr val="accent1"/>
+          </a:fillRef>
+          <a:effectRef idx="0">
+            <a:schemeClr val="accent1"/>
+          </a:effectRef>
+          <a:fontRef idx="minor">
+            <a:schemeClr val="lt1"/>
+          </a:fontRef>
+        </p:style>
+        <p:txBody>
+          <a:bodyPr rtlCol="0" anchor="ctr"/>
+          <a:lstStyle/>
+          <a:p>
+            <a:pPr algn="r"/>
+            <a:r>
+              <a:rPr lang="en-US" sz="300" dirty="0"/>
+              <a:t>from –to</a:t>
+            </a:r>
+          </a:p>
+          <a:p>
+            <a:pPr algn="r"/>
+            <a:r>
+              <a:rPr lang="en-US" sz="300" dirty="0"/>
+              <a:t>Incoming date</a:t>
+            </a:r>
+          </a:p>
+          <a:p>
+            <a:pPr algn="r"/>
+            <a:r>
+              <a:rPr lang="en-US" sz="300" dirty="0"/>
+              <a:t>Delivery date</a:t>
+            </a:r>
+            <a:endParaRPr lang="bg-BG" sz="300" dirty="0"/>
+          </a:p>
+        </p:txBody>
+      </p:sp>
+      <p:pic>
+        <p:nvPicPr>
+          <p:cNvPr id="71" name="Picture 70">
+            <a:extLst>
+              <a:ext uri="{FF2B5EF4-FFF2-40B4-BE49-F238E27FC236}">
+                <a16:creationId xmlns:a16="http://schemas.microsoft.com/office/drawing/2014/main" id="{C997B268-6F0E-D89A-0211-7AF894FB6C8D}"/>
+              </a:ext>
+            </a:extLst>
+          </p:cNvPr>
+          <p:cNvPicPr>
+            <a:picLocks noChangeAspect="1"/>
+          </p:cNvPicPr>
+          <p:nvPr/>
+        </p:nvPicPr>
+        <p:blipFill>
+          <a:blip r:embed="rId2"/>
+          <a:stretch>
+            <a:fillRect/>
+          </a:stretch>
+        </p:blipFill>
+        <p:spPr>
+          <a:xfrm>
+            <a:off x="1993900" y="1893152"/>
+            <a:ext cx="206714" cy="199707"/>
+          </a:xfrm>
+          <a:prstGeom prst="rect">
+            <a:avLst/>
+          </a:prstGeom>
+        </p:spPr>
+      </p:pic>
+      <p:pic>
+        <p:nvPicPr>
+          <p:cNvPr id="72" name="Picture 71">
+            <a:extLst>
+              <a:ext uri="{FF2B5EF4-FFF2-40B4-BE49-F238E27FC236}">
+                <a16:creationId xmlns:a16="http://schemas.microsoft.com/office/drawing/2014/main" id="{1996DBED-94F2-692A-FC1F-7A5CA099AE01}"/>
+              </a:ext>
+            </a:extLst>
+          </p:cNvPr>
+          <p:cNvPicPr>
+            <a:picLocks noChangeAspect="1"/>
+          </p:cNvPicPr>
+          <p:nvPr/>
+        </p:nvPicPr>
+        <p:blipFill>
+          <a:blip r:embed="rId2"/>
+          <a:stretch>
+            <a:fillRect/>
+          </a:stretch>
+        </p:blipFill>
+        <p:spPr>
+          <a:xfrm>
+            <a:off x="1993900" y="1189000"/>
+            <a:ext cx="206714" cy="199707"/>
+          </a:xfrm>
+          <a:prstGeom prst="rect">
+            <a:avLst/>
+          </a:prstGeom>
+        </p:spPr>
+      </p:pic>
       <p:pic>
         <p:nvPicPr>
           <p:cNvPr id="21" name="Picture 20">
             <a:extLst>
               <a:ext uri="{FF2B5EF4-FFF2-40B4-BE49-F238E27FC236}">
-                <a16:creationId xmlns:a16="http://schemas.microsoft.com/office/drawing/2014/main" id="{849E8523-853D-8661-D945-DD7A75E4BB2D}"/>
+                <a16:creationId xmlns:a16="http://schemas.microsoft.com/office/drawing/2014/main" id="{5A8778ED-B9C8-FE1D-B584-EB76605DC79A}"/>
               </a:ext>
             </a:extLst>
           </p:cNvPr>
@@ -12581,25 +15156,280 @@
         </p:nvPicPr>
         <p:blipFill>
           <a:blip r:embed="rId3"/>
-          <a:srcRect t="19420"/>
+          <a:srcRect l="13357" t="19420" r="40598"/>
           <a:stretch>
             <a:fillRect/>
           </a:stretch>
         </p:blipFill>
         <p:spPr>
           <a:xfrm>
-            <a:off x="245165" y="116734"/>
-            <a:ext cx="11191185" cy="381000"/>
+            <a:off x="914400" y="258925"/>
+            <a:ext cx="7321550" cy="381000"/>
           </a:xfrm>
           <a:prstGeom prst="rect">
             <a:avLst/>
           </a:prstGeom>
         </p:spPr>
       </p:pic>
+      <p:cxnSp>
+        <p:nvCxnSpPr>
+          <p:cNvPr id="30" name="Straight Arrow Connector 29">
+            <a:extLst>
+              <a:ext uri="{FF2B5EF4-FFF2-40B4-BE49-F238E27FC236}">
+                <a16:creationId xmlns:a16="http://schemas.microsoft.com/office/drawing/2014/main" id="{7696BE74-9564-C182-6593-4855AC21334C}"/>
+              </a:ext>
+            </a:extLst>
+          </p:cNvPr>
+          <p:cNvCxnSpPr>
+            <a:endCxn id="5" idx="1"/>
+          </p:cNvCxnSpPr>
+          <p:nvPr/>
+        </p:nvCxnSpPr>
+        <p:spPr>
+          <a:xfrm>
+            <a:off x="1384300" y="907675"/>
+            <a:ext cx="723525" cy="0"/>
+          </a:xfrm>
+          <a:prstGeom prst="straightConnector1">
+            <a:avLst/>
+          </a:prstGeom>
+          <a:ln>
+            <a:tailEnd type="triangle"/>
+          </a:ln>
+        </p:spPr>
+        <p:style>
+          <a:lnRef idx="2">
+            <a:schemeClr val="accent1"/>
+          </a:lnRef>
+          <a:fillRef idx="0">
+            <a:schemeClr val="accent1"/>
+          </a:fillRef>
+          <a:effectRef idx="1">
+            <a:schemeClr val="accent1"/>
+          </a:effectRef>
+          <a:fontRef idx="minor">
+            <a:schemeClr val="tx1"/>
+          </a:fontRef>
+        </p:style>
+      </p:cxnSp>
+      <p:sp>
+        <p:nvSpPr>
+          <p:cNvPr id="73" name="Oval 72">
+            <a:extLst>
+              <a:ext uri="{FF2B5EF4-FFF2-40B4-BE49-F238E27FC236}">
+                <a16:creationId xmlns:a16="http://schemas.microsoft.com/office/drawing/2014/main" id="{6825888F-5784-ACC3-1B7D-72118CC967A1}"/>
+              </a:ext>
+            </a:extLst>
+          </p:cNvPr>
+          <p:cNvSpPr/>
+          <p:nvPr/>
+        </p:nvSpPr>
+        <p:spPr>
+          <a:xfrm>
+            <a:off x="1917700" y="738779"/>
+            <a:ext cx="682188" cy="2563221"/>
+          </a:xfrm>
+          <a:prstGeom prst="ellipse">
+            <a:avLst/>
+          </a:prstGeom>
+          <a:noFill/>
+        </p:spPr>
+        <p:style>
+          <a:lnRef idx="2">
+            <a:schemeClr val="accent1">
+              <a:shade val="15000"/>
+            </a:schemeClr>
+          </a:lnRef>
+          <a:fillRef idx="1">
+            <a:schemeClr val="accent1"/>
+          </a:fillRef>
+          <a:effectRef idx="0">
+            <a:schemeClr val="accent1"/>
+          </a:effectRef>
+          <a:fontRef idx="minor">
+            <a:schemeClr val="lt1"/>
+          </a:fontRef>
+        </p:style>
+        <p:txBody>
+          <a:bodyPr rtlCol="0" anchor="ctr"/>
+          <a:lstStyle/>
+          <a:p>
+            <a:pPr algn="ctr"/>
+            <a:endParaRPr lang="bg-BG"/>
+          </a:p>
+        </p:txBody>
+      </p:sp>
+      <p:sp>
+        <p:nvSpPr>
+          <p:cNvPr id="74" name="TextBox 73">
+            <a:extLst>
+              <a:ext uri="{FF2B5EF4-FFF2-40B4-BE49-F238E27FC236}">
+                <a16:creationId xmlns:a16="http://schemas.microsoft.com/office/drawing/2014/main" id="{A4591D39-EB8D-8901-3B5C-64DDB2527ECF}"/>
+              </a:ext>
+            </a:extLst>
+          </p:cNvPr>
+          <p:cNvSpPr txBox="1"/>
+          <p:nvPr/>
+        </p:nvSpPr>
+        <p:spPr>
+          <a:xfrm>
+            <a:off x="680035" y="717550"/>
+            <a:ext cx="890536" cy="584775"/>
+          </a:xfrm>
+          <a:prstGeom prst="rect">
+            <a:avLst/>
+          </a:prstGeom>
+          <a:noFill/>
+        </p:spPr>
+        <p:txBody>
+          <a:bodyPr wrap="square" rtlCol="0">
+            <a:spAutoFit/>
+          </a:bodyPr>
+          <a:lstStyle/>
+          <a:p>
+            <a:r>
+              <a:rPr lang="en-US" sz="800" dirty="0"/>
+              <a:t>List of all loads arriving in the warehouse on this date</a:t>
+            </a:r>
+            <a:endParaRPr lang="bg-BG" sz="800" dirty="0"/>
+          </a:p>
+        </p:txBody>
+      </p:sp>
+      <p:sp>
+        <p:nvSpPr>
+          <p:cNvPr id="75" name="TextBox 74">
+            <a:extLst>
+              <a:ext uri="{FF2B5EF4-FFF2-40B4-BE49-F238E27FC236}">
+                <a16:creationId xmlns:a16="http://schemas.microsoft.com/office/drawing/2014/main" id="{3FF8DC46-AB80-0EC4-67D9-9E2ABDB420ED}"/>
+              </a:ext>
+            </a:extLst>
+          </p:cNvPr>
+          <p:cNvSpPr txBox="1"/>
+          <p:nvPr/>
+        </p:nvSpPr>
+        <p:spPr>
+          <a:xfrm>
+            <a:off x="3392102" y="717550"/>
+            <a:ext cx="890536" cy="461665"/>
+          </a:xfrm>
+          <a:prstGeom prst="rect">
+            <a:avLst/>
+          </a:prstGeom>
+          <a:noFill/>
+        </p:spPr>
+        <p:txBody>
+          <a:bodyPr wrap="square" rtlCol="0">
+            <a:spAutoFit/>
+          </a:bodyPr>
+          <a:lstStyle/>
+          <a:p>
+            <a:r>
+              <a:rPr lang="en-US" sz="800" dirty="0"/>
+              <a:t>List of all loads to be loaded  on this date</a:t>
+            </a:r>
+            <a:endParaRPr lang="bg-BG" sz="800" dirty="0"/>
+          </a:p>
+        </p:txBody>
+      </p:sp>
+      <p:cxnSp>
+        <p:nvCxnSpPr>
+          <p:cNvPr id="77" name="Straight Arrow Connector 76">
+            <a:extLst>
+              <a:ext uri="{FF2B5EF4-FFF2-40B4-BE49-F238E27FC236}">
+                <a16:creationId xmlns:a16="http://schemas.microsoft.com/office/drawing/2014/main" id="{7FD0555E-4CD7-9C70-9227-E06A4C090747}"/>
+              </a:ext>
+            </a:extLst>
+          </p:cNvPr>
+          <p:cNvCxnSpPr>
+            <a:endCxn id="6" idx="3"/>
+          </p:cNvCxnSpPr>
+          <p:nvPr/>
+        </p:nvCxnSpPr>
+        <p:spPr>
+          <a:xfrm flipH="1">
+            <a:off x="3117883" y="907675"/>
+            <a:ext cx="190467" cy="0"/>
+          </a:xfrm>
+          <a:prstGeom prst="straightConnector1">
+            <a:avLst/>
+          </a:prstGeom>
+          <a:ln>
+            <a:tailEnd type="triangle"/>
+          </a:ln>
+        </p:spPr>
+        <p:style>
+          <a:lnRef idx="2">
+            <a:schemeClr val="accent2"/>
+          </a:lnRef>
+          <a:fillRef idx="0">
+            <a:schemeClr val="accent2"/>
+          </a:fillRef>
+          <a:effectRef idx="1">
+            <a:schemeClr val="accent2"/>
+          </a:effectRef>
+          <a:fontRef idx="minor">
+            <a:schemeClr val="tx1"/>
+          </a:fontRef>
+        </p:style>
+      </p:cxnSp>
+      <p:sp>
+        <p:nvSpPr>
+          <p:cNvPr id="78" name="Oval 77">
+            <a:extLst>
+              <a:ext uri="{FF2B5EF4-FFF2-40B4-BE49-F238E27FC236}">
+                <a16:creationId xmlns:a16="http://schemas.microsoft.com/office/drawing/2014/main" id="{AF8D747A-CB4C-8401-CE5D-450E75152CD7}"/>
+              </a:ext>
+            </a:extLst>
+          </p:cNvPr>
+          <p:cNvSpPr/>
+          <p:nvPr/>
+        </p:nvSpPr>
+        <p:spPr>
+          <a:xfrm>
+            <a:off x="2539071" y="738779"/>
+            <a:ext cx="725602" cy="2506071"/>
+          </a:xfrm>
+          <a:prstGeom prst="ellipse">
+            <a:avLst/>
+          </a:prstGeom>
+          <a:noFill/>
+          <a:ln>
+            <a:solidFill>
+              <a:schemeClr val="accent2">
+                <a:lumMod val="75000"/>
+              </a:schemeClr>
+            </a:solidFill>
+          </a:ln>
+        </p:spPr>
+        <p:style>
+          <a:lnRef idx="2">
+            <a:schemeClr val="accent1">
+              <a:shade val="15000"/>
+            </a:schemeClr>
+          </a:lnRef>
+          <a:fillRef idx="1">
+            <a:schemeClr val="accent1"/>
+          </a:fillRef>
+          <a:effectRef idx="0">
+            <a:schemeClr val="accent1"/>
+          </a:effectRef>
+          <a:fontRef idx="minor">
+            <a:schemeClr val="lt1"/>
+          </a:fontRef>
+        </p:style>
+        <p:txBody>
+          <a:bodyPr rtlCol="0" anchor="ctr"/>
+          <a:lstStyle/>
+          <a:p>
+            <a:pPr algn="ctr"/>
+            <a:endParaRPr lang="bg-BG"/>
+          </a:p>
+        </p:txBody>
+      </p:sp>
     </p:spTree>
     <p:extLst>
       <p:ext uri="{BB962C8B-B14F-4D97-AF65-F5344CB8AC3E}">
-        <p14:creationId xmlns:p14="http://schemas.microsoft.com/office/powerpoint/2010/main" val="3570448956"/>
+        <p14:creationId xmlns:p14="http://schemas.microsoft.com/office/powerpoint/2010/main" val="3971886694"/>
       </p:ext>
     </p:extLst>
   </p:cSld>

</xml_diff>